<commit_message>
feat: smernice i prezentacija finalno
</commit_message>
<xml_diff>
--- a/Nevena Gligorov diplomski prezentacija.pptx
+++ b/Nevena Gligorov diplomski prezentacija.pptx
@@ -5,10 +5,10 @@
     <p:sldMasterId id="2147483648" r:id="rId4"/>
   </p:sldMasterIdLst>
   <p:notesMasterIdLst>
-    <p:notesMasterId r:id="rId27"/>
+    <p:notesMasterId r:id="rId28"/>
   </p:notesMasterIdLst>
   <p:handoutMasterIdLst>
-    <p:handoutMasterId r:id="rId28"/>
+    <p:handoutMasterId r:id="rId29"/>
   </p:handoutMasterIdLst>
   <p:sldIdLst>
     <p:sldId id="256" r:id="rId5"/>
@@ -32,7 +32,8 @@
     <p:sldId id="301" r:id="rId23"/>
     <p:sldId id="302" r:id="rId24"/>
     <p:sldId id="303" r:id="rId25"/>
-    <p:sldId id="285" r:id="rId26"/>
+    <p:sldId id="304" r:id="rId26"/>
+    <p:sldId id="285" r:id="rId27"/>
   </p:sldIdLst>
   <p:sldSz cx="12192000" cy="6858000"/>
   <p:notesSz cx="6858000" cy="9144000"/>
@@ -267,7 +268,7 @@
           <a:p>
             <a:fld id="{6E5C0719-993D-42E1-80ED-8F01056F36C2}" type="datetimeFigureOut">
               <a:rPr lang="en-US" smtClean="0"/>
-              <a:t>9/17/2024</a:t>
+              <a:t>9/24/2024</a:t>
             </a:fld>
             <a:endParaRPr lang="en-US" dirty="0"/>
           </a:p>
@@ -444,7 +445,7 @@
           <a:p>
             <a:fld id="{21D3BC9C-6C58-464F-B94E-FD73C5FB016E}" type="datetimeFigureOut">
               <a:rPr lang="en-US" smtClean="0"/>
-              <a:t>9/17/2024</a:t>
+              <a:t>9/24/2024</a:t>
             </a:fld>
             <a:endParaRPr lang="en-US" dirty="0"/>
           </a:p>
@@ -1961,6 +1962,90 @@
     </p:spTree>
     <p:extLst>
       <p:ext uri="{BB962C8B-B14F-4D97-AF65-F5344CB8AC3E}">
+        <p14:creationId xmlns:p14="http://schemas.microsoft.com/office/powerpoint/2010/main" val="2714070202"/>
+      </p:ext>
+    </p:extLst>
+  </p:cSld>
+  <p:clrMapOvr>
+    <a:masterClrMapping/>
+  </p:clrMapOvr>
+</p:notes>
+</file>
+
+<file path=ppt/notesSlides/notesSlide23.xml><?xml version="1.0" encoding="utf-8"?>
+<p:notes xmlns:a="http://schemas.openxmlformats.org/drawingml/2006/main" xmlns:r="http://schemas.openxmlformats.org/officeDocument/2006/relationships" xmlns:p="http://schemas.openxmlformats.org/presentationml/2006/main">
+  <p:cSld>
+    <p:spTree>
+      <p:nvGrpSpPr>
+        <p:cNvPr id="1" name=""/>
+        <p:cNvGrpSpPr/>
+        <p:nvPr/>
+      </p:nvGrpSpPr>
+      <p:grpSpPr>
+        <a:xfrm>
+          <a:off x="0" y="0"/>
+          <a:ext cx="0" cy="0"/>
+          <a:chOff x="0" y="0"/>
+          <a:chExt cx="0" cy="0"/>
+        </a:xfrm>
+      </p:grpSpPr>
+      <p:sp>
+        <p:nvSpPr>
+          <p:cNvPr id="2" name="Slide Image Placeholder 1"/>
+          <p:cNvSpPr>
+            <a:spLocks noGrp="1" noRot="1" noChangeAspect="1"/>
+          </p:cNvSpPr>
+          <p:nvPr>
+            <p:ph type="sldImg"/>
+          </p:nvPr>
+        </p:nvSpPr>
+        <p:spPr/>
+      </p:sp>
+      <p:sp>
+        <p:nvSpPr>
+          <p:cNvPr id="3" name="Notes Placeholder 2"/>
+          <p:cNvSpPr>
+            <a:spLocks noGrp="1"/>
+          </p:cNvSpPr>
+          <p:nvPr>
+            <p:ph type="body" idx="1"/>
+          </p:nvPr>
+        </p:nvSpPr>
+        <p:spPr/>
+        <p:txBody>
+          <a:bodyPr/>
+          <a:lstStyle/>
+          <a:p>
+            <a:endParaRPr lang="en-US" dirty="0"/>
+          </a:p>
+        </p:txBody>
+      </p:sp>
+      <p:sp>
+        <p:nvSpPr>
+          <p:cNvPr id="4" name="Slide Number Placeholder 3"/>
+          <p:cNvSpPr>
+            <a:spLocks noGrp="1"/>
+          </p:cNvSpPr>
+          <p:nvPr>
+            <p:ph type="sldNum" sz="quarter" idx="5"/>
+          </p:nvPr>
+        </p:nvSpPr>
+        <p:spPr/>
+        <p:txBody>
+          <a:bodyPr/>
+          <a:lstStyle/>
+          <a:p>
+            <a:fld id="{BE60DC36-8EFA-4378-9855-E019C55AC472}" type="slidenum">
+              <a:rPr lang="en-US" smtClean="0"/>
+              <a:t>23</a:t>
+            </a:fld>
+            <a:endParaRPr lang="en-US" dirty="0"/>
+          </a:p>
+        </p:txBody>
+      </p:sp>
+    </p:spTree>
+    <p:extLst>
+      <p:ext uri="{BB962C8B-B14F-4D97-AF65-F5344CB8AC3E}">
         <p14:creationId xmlns:p14="http://schemas.microsoft.com/office/powerpoint/2010/main" val="396791894"/>
       </p:ext>
     </p:extLst>
@@ -2708,7 +2793,7 @@
           <a:p>
             <a:fld id="{40DA1498-92C7-4E4B-8045-C9195F453964}" type="datetimeFigureOut">
               <a:rPr lang="en-US" smtClean="0"/>
-              <a:t>9/17/2024</a:t>
+              <a:t>9/24/2024</a:t>
             </a:fld>
             <a:endParaRPr lang="en-US" dirty="0"/>
           </a:p>
@@ -2908,7 +2993,7 @@
           <a:p>
             <a:fld id="{40DA1498-92C7-4E4B-8045-C9195F453964}" type="datetimeFigureOut">
               <a:rPr lang="en-US" smtClean="0"/>
-              <a:t>9/17/2024</a:t>
+              <a:t>9/24/2024</a:t>
             </a:fld>
             <a:endParaRPr lang="en-US" dirty="0"/>
           </a:p>
@@ -3118,7 +3203,7 @@
           <a:p>
             <a:fld id="{40DA1498-92C7-4E4B-8045-C9195F453964}" type="datetimeFigureOut">
               <a:rPr lang="en-US" smtClean="0"/>
-              <a:t>9/17/2024</a:t>
+              <a:t>9/24/2024</a:t>
             </a:fld>
             <a:endParaRPr lang="en-US" dirty="0"/>
           </a:p>
@@ -3318,7 +3403,7 @@
           <a:p>
             <a:fld id="{40DA1498-92C7-4E4B-8045-C9195F453964}" type="datetimeFigureOut">
               <a:rPr lang="en-US" smtClean="0"/>
-              <a:t>9/17/2024</a:t>
+              <a:t>9/24/2024</a:t>
             </a:fld>
             <a:endParaRPr lang="en-US" dirty="0"/>
           </a:p>
@@ -3594,7 +3679,7 @@
           <a:p>
             <a:fld id="{40DA1498-92C7-4E4B-8045-C9195F453964}" type="datetimeFigureOut">
               <a:rPr lang="en-US" smtClean="0"/>
-              <a:t>9/17/2024</a:t>
+              <a:t>9/24/2024</a:t>
             </a:fld>
             <a:endParaRPr lang="en-US" dirty="0"/>
           </a:p>
@@ -3862,7 +3947,7 @@
           <a:p>
             <a:fld id="{40DA1498-92C7-4E4B-8045-C9195F453964}" type="datetimeFigureOut">
               <a:rPr lang="en-US" smtClean="0"/>
-              <a:t>9/17/2024</a:t>
+              <a:t>9/24/2024</a:t>
             </a:fld>
             <a:endParaRPr lang="en-US" dirty="0"/>
           </a:p>
@@ -4277,7 +4362,7 @@
           <a:p>
             <a:fld id="{40DA1498-92C7-4E4B-8045-C9195F453964}" type="datetimeFigureOut">
               <a:rPr lang="en-US" smtClean="0"/>
-              <a:t>9/17/2024</a:t>
+              <a:t>9/24/2024</a:t>
             </a:fld>
             <a:endParaRPr lang="en-US" dirty="0"/>
           </a:p>
@@ -4419,7 +4504,7 @@
           <a:p>
             <a:fld id="{40DA1498-92C7-4E4B-8045-C9195F453964}" type="datetimeFigureOut">
               <a:rPr lang="en-US" smtClean="0"/>
-              <a:t>9/17/2024</a:t>
+              <a:t>9/24/2024</a:t>
             </a:fld>
             <a:endParaRPr lang="en-US" dirty="0"/>
           </a:p>
@@ -4532,7 +4617,7 @@
           <a:p>
             <a:fld id="{40DA1498-92C7-4E4B-8045-C9195F453964}" type="datetimeFigureOut">
               <a:rPr lang="en-US" smtClean="0"/>
-              <a:t>9/17/2024</a:t>
+              <a:t>9/24/2024</a:t>
             </a:fld>
             <a:endParaRPr lang="en-US" dirty="0"/>
           </a:p>
@@ -4845,7 +4930,7 @@
           <a:p>
             <a:fld id="{40DA1498-92C7-4E4B-8045-C9195F453964}" type="datetimeFigureOut">
               <a:rPr lang="en-US" smtClean="0"/>
-              <a:t>9/17/2024</a:t>
+              <a:t>9/24/2024</a:t>
             </a:fld>
             <a:endParaRPr lang="en-US" dirty="0"/>
           </a:p>
@@ -5138,7 +5223,7 @@
           <a:p>
             <a:fld id="{40DA1498-92C7-4E4B-8045-C9195F453964}" type="datetimeFigureOut">
               <a:rPr lang="en-US" smtClean="0"/>
-              <a:t>9/17/2024</a:t>
+              <a:t>9/24/2024</a:t>
             </a:fld>
             <a:endParaRPr lang="en-US" dirty="0"/>
           </a:p>
@@ -5381,7 +5466,7 @@
           <a:p>
             <a:fld id="{40DA1498-92C7-4E4B-8045-C9195F453964}" type="datetimeFigureOut">
               <a:rPr lang="en-US" smtClean="0"/>
-              <a:t>9/17/2024</a:t>
+              <a:t>9/24/2024</a:t>
             </a:fld>
             <a:endParaRPr lang="en-US" dirty="0"/>
           </a:p>
@@ -5852,12 +5937,20 @@
               <a:t>DebugIt</a:t>
             </a:r>
             <a:r>
+              <a:rPr lang="en-US" sz="4000" b="1" dirty="0">
+                <a:solidFill>
+                  <a:schemeClr val="bg1"/>
+                </a:solidFill>
+              </a:rPr>
+              <a:t>:</a:t>
+            </a:r>
+            <a:r>
               <a:rPr lang="en-US" sz="4000" b="1" dirty="0" smtClean="0">
                 <a:solidFill>
                   <a:schemeClr val="bg1"/>
                 </a:solidFill>
               </a:rPr>
-              <a:t> – </a:t>
+              <a:t> </a:t>
             </a:r>
             <a:r>
               <a:rPr lang="en-US" sz="4000" b="1" dirty="0" err="1" smtClean="0">
@@ -5876,12 +5969,12 @@
               <a:t> </a:t>
             </a:r>
             <a:r>
-              <a:rPr lang="en-US" sz="4000" b="1" i="1" dirty="0" smtClean="0">
+              <a:rPr lang="en-US" sz="4000" b="1" dirty="0" err="1" smtClean="0">
                 <a:solidFill>
                   <a:schemeClr val="bg1"/>
                 </a:solidFill>
               </a:rPr>
-              <a:t>QA</a:t>
+              <a:t>platforma</a:t>
             </a:r>
             <a:r>
               <a:rPr lang="en-US" sz="4000" b="1" dirty="0" smtClean="0">
@@ -5897,7 +5990,7 @@
                   <a:schemeClr val="bg1"/>
                 </a:solidFill>
               </a:rPr>
-              <a:t>platforma</a:t>
+              <a:t>za</a:t>
             </a:r>
             <a:r>
               <a:rPr lang="en-US" sz="4000" b="1" dirty="0" smtClean="0">
@@ -5913,7 +6006,7 @@
                   <a:schemeClr val="bg1"/>
                 </a:solidFill>
               </a:rPr>
-              <a:t>koja</a:t>
+              <a:t>diskusiju</a:t>
             </a:r>
             <a:r>
               <a:rPr lang="en-US" sz="4000" b="1" dirty="0" smtClean="0">
@@ -5929,7 +6022,23 @@
                   <a:schemeClr val="bg1"/>
                 </a:solidFill>
               </a:rPr>
-              <a:t>integri</a:t>
+              <a:t>sa</a:t>
+            </a:r>
+            <a:r>
+              <a:rPr lang="en-US" sz="4000" b="1" dirty="0" smtClean="0">
+                <a:solidFill>
+                  <a:schemeClr val="bg1"/>
+                </a:solidFill>
+              </a:rPr>
+              <a:t> </a:t>
+            </a:r>
+            <a:r>
+              <a:rPr lang="en-US" sz="4000" b="1" dirty="0" err="1" smtClean="0">
+                <a:solidFill>
+                  <a:schemeClr val="bg1"/>
+                </a:solidFill>
+              </a:rPr>
+              <a:t>integracijom</a:t>
             </a:r>
             <a:r>
               <a:rPr lang="sr-Latn-RS" sz="4000" b="1" dirty="0" smtClean="0">
@@ -5937,7 +6046,7 @@
                   <a:schemeClr val="bg1"/>
                 </a:solidFill>
               </a:rPr>
-              <a:t>še </a:t>
+              <a:t> </a:t>
             </a:r>
             <a:r>
               <a:rPr lang="en-US" sz="4000" b="1" i="1" dirty="0" err="1" smtClean="0">
@@ -5946,22 +6055,6 @@
                 </a:solidFill>
               </a:rPr>
               <a:t>Elasticsearch</a:t>
-            </a:r>
-            <a:r>
-              <a:rPr lang="en-US" sz="4000" b="1" dirty="0" smtClean="0">
-                <a:solidFill>
-                  <a:schemeClr val="bg1"/>
-                </a:solidFill>
-              </a:rPr>
-              <a:t> </a:t>
-            </a:r>
-            <a:r>
-              <a:rPr lang="en-US" sz="4000" b="1" dirty="0" err="1" smtClean="0">
-                <a:solidFill>
-                  <a:schemeClr val="bg1"/>
-                </a:solidFill>
-              </a:rPr>
-              <a:t>mehanizam</a:t>
             </a:r>
             <a:r>
               <a:rPr lang="en-US" sz="4000" b="1" dirty="0" smtClean="0">
@@ -7389,196 +7482,6 @@
           </p:txBody>
         </p:sp>
       </p:grpSp>
-      <p:sp>
-        <p:nvSpPr>
-          <p:cNvPr id="12" name="Title 1">
-            <a:extLst>
-              <a:ext uri="{FF2B5EF4-FFF2-40B4-BE49-F238E27FC236}">
-                <a16:creationId xmlns:a16="http://schemas.microsoft.com/office/drawing/2014/main" id="{C4300AEF-1595-4419-801B-6E36A33BB8CF}"/>
-              </a:ext>
-            </a:extLst>
-          </p:cNvPr>
-          <p:cNvSpPr txBox="1">
-            <a:spLocks/>
-          </p:cNvSpPr>
-          <p:nvPr/>
-        </p:nvSpPr>
-        <p:spPr>
-          <a:xfrm>
-            <a:off x="8514396" y="5918717"/>
-            <a:ext cx="4155831" cy="553998"/>
-          </a:xfrm>
-          <a:prstGeom prst="rect">
-            <a:avLst/>
-          </a:prstGeom>
-        </p:spPr>
-        <p:txBody>
-          <a:bodyPr vert="horz" wrap="square" lIns="0" tIns="0" rIns="0" bIns="0" rtlCol="0" anchor="t">
-            <a:spAutoFit/>
-          </a:bodyPr>
-          <a:lstStyle>
-            <a:lvl1pPr algn="ctr" defTabSz="914400" rtl="0" eaLnBrk="1" latinLnBrk="0" hangingPunct="1">
-              <a:lnSpc>
-                <a:spcPct val="90000"/>
-              </a:lnSpc>
-              <a:spcBef>
-                <a:spcPct val="0"/>
-              </a:spcBef>
-              <a:buNone/>
-              <a:defRPr sz="6000" kern="1200">
-                <a:solidFill>
-                  <a:schemeClr val="tx1"/>
-                </a:solidFill>
-                <a:latin typeface="+mj-lt"/>
-                <a:ea typeface="+mj-ea"/>
-                <a:cs typeface="+mj-cs"/>
-              </a:defRPr>
-            </a:lvl1pPr>
-          </a:lstStyle>
-          <a:p>
-            <a:pPr algn="l"/>
-            <a:r>
-              <a:rPr lang="en-US" sz="2000" b="1" dirty="0" smtClean="0">
-                <a:solidFill>
-                  <a:schemeClr val="bg1"/>
-                </a:solidFill>
-              </a:rPr>
-              <a:t>Mentor:</a:t>
-            </a:r>
-          </a:p>
-          <a:p>
-            <a:pPr algn="l"/>
-            <a:r>
-              <a:rPr lang="en-US" sz="2000" b="1" dirty="0" smtClean="0">
-                <a:solidFill>
-                  <a:schemeClr val="bg1"/>
-                </a:solidFill>
-              </a:rPr>
-              <a:t>dr. </a:t>
-            </a:r>
-            <a:r>
-              <a:rPr lang="en-US" sz="2000" b="1" dirty="0" err="1" smtClean="0">
-                <a:solidFill>
-                  <a:schemeClr val="bg1"/>
-                </a:solidFill>
-              </a:rPr>
-              <a:t>Dunja</a:t>
-            </a:r>
-            <a:r>
-              <a:rPr lang="en-US" sz="2000" b="1" dirty="0" smtClean="0">
-                <a:solidFill>
-                  <a:schemeClr val="bg1"/>
-                </a:solidFill>
-              </a:rPr>
-              <a:t> </a:t>
-            </a:r>
-            <a:r>
-              <a:rPr lang="sr-Latn-RS" sz="2000" b="1" dirty="0" smtClean="0">
-                <a:solidFill>
-                  <a:schemeClr val="bg1"/>
-                </a:solidFill>
-              </a:rPr>
-              <a:t>Vrbaški, docent</a:t>
-            </a:r>
-            <a:endParaRPr lang="en-US" sz="2800" dirty="0">
-              <a:solidFill>
-                <a:schemeClr val="accent4"/>
-              </a:solidFill>
-            </a:endParaRPr>
-          </a:p>
-        </p:txBody>
-      </p:sp>
-      <p:sp>
-        <p:nvSpPr>
-          <p:cNvPr id="13" name="Title 1">
-            <a:extLst>
-              <a:ext uri="{FF2B5EF4-FFF2-40B4-BE49-F238E27FC236}">
-                <a16:creationId xmlns:a16="http://schemas.microsoft.com/office/drawing/2014/main" id="{C4300AEF-1595-4419-801B-6E36A33BB8CF}"/>
-              </a:ext>
-            </a:extLst>
-          </p:cNvPr>
-          <p:cNvSpPr txBox="1">
-            <a:spLocks/>
-          </p:cNvSpPr>
-          <p:nvPr/>
-        </p:nvSpPr>
-        <p:spPr>
-          <a:xfrm>
-            <a:off x="727342" y="5918717"/>
-            <a:ext cx="4155831" cy="553998"/>
-          </a:xfrm>
-          <a:prstGeom prst="rect">
-            <a:avLst/>
-          </a:prstGeom>
-        </p:spPr>
-        <p:txBody>
-          <a:bodyPr vert="horz" wrap="square" lIns="0" tIns="0" rIns="0" bIns="0" rtlCol="0" anchor="t">
-            <a:spAutoFit/>
-          </a:bodyPr>
-          <a:lstStyle>
-            <a:lvl1pPr algn="ctr" defTabSz="914400" rtl="0" eaLnBrk="1" latinLnBrk="0" hangingPunct="1">
-              <a:lnSpc>
-                <a:spcPct val="90000"/>
-              </a:lnSpc>
-              <a:spcBef>
-                <a:spcPct val="0"/>
-              </a:spcBef>
-              <a:buNone/>
-              <a:defRPr sz="6000" kern="1200">
-                <a:solidFill>
-                  <a:schemeClr val="tx1"/>
-                </a:solidFill>
-                <a:latin typeface="+mj-lt"/>
-                <a:ea typeface="+mj-ea"/>
-                <a:cs typeface="+mj-cs"/>
-              </a:defRPr>
-            </a:lvl1pPr>
-          </a:lstStyle>
-          <a:p>
-            <a:pPr algn="l"/>
-            <a:r>
-              <a:rPr lang="en-US" sz="2000" b="1" dirty="0" smtClean="0">
-                <a:solidFill>
-                  <a:schemeClr val="bg1"/>
-                </a:solidFill>
-              </a:rPr>
-              <a:t>Student:</a:t>
-            </a:r>
-          </a:p>
-          <a:p>
-            <a:pPr algn="l"/>
-            <a:r>
-              <a:rPr lang="en-US" sz="2000" b="1" dirty="0" err="1" smtClean="0">
-                <a:solidFill>
-                  <a:schemeClr val="bg1"/>
-                </a:solidFill>
-              </a:rPr>
-              <a:t>Nevena</a:t>
-            </a:r>
-            <a:r>
-              <a:rPr lang="en-US" sz="2000" b="1" dirty="0" smtClean="0">
-                <a:solidFill>
-                  <a:schemeClr val="bg1"/>
-                </a:solidFill>
-              </a:rPr>
-              <a:t> </a:t>
-            </a:r>
-            <a:r>
-              <a:rPr lang="en-US" sz="2000" b="1" dirty="0" err="1" smtClean="0">
-                <a:solidFill>
-                  <a:schemeClr val="bg1"/>
-                </a:solidFill>
-              </a:rPr>
-              <a:t>Gligorov</a:t>
-            </a:r>
-            <a:endParaRPr lang="en-US" sz="2800" b="1" dirty="0">
-              <a:solidFill>
-                <a:schemeClr val="accent4"/>
-              </a:solidFill>
-            </a:endParaRPr>
-          </a:p>
-        </p:txBody>
-      </p:sp>
     </p:spTree>
     <p:extLst>
       <p:ext uri="{BB962C8B-B14F-4D97-AF65-F5344CB8AC3E}">
@@ -7799,7 +7702,7 @@
         <p:spPr>
           <a:xfrm>
             <a:off x="690379" y="1145182"/>
-            <a:ext cx="10811242" cy="4398640"/>
+            <a:ext cx="10811242" cy="1661993"/>
           </a:xfrm>
           <a:prstGeom prst="rect">
             <a:avLst/>
@@ -7842,10 +7745,10 @@
                 <a:latin typeface="Segoe UI" panose="020B0502040204020203" pitchFamily="34" charset="0"/>
                 <a:cs typeface="Segoe UI" panose="020B0502040204020203" pitchFamily="34" charset="0"/>
               </a:rPr>
-              <a:t> = server </a:t>
-            </a:r>
-            <a:r>
-              <a:rPr lang="en-US" dirty="0" err="1" smtClean="0">
+              <a:t> = </a:t>
+            </a:r>
+            <a:r>
+              <a:rPr lang="en-US" dirty="0" smtClean="0">
                 <a:solidFill>
                   <a:schemeClr val="tx1">
                     <a:lumMod val="75000"/>
@@ -7855,99 +7758,18 @@
                 <a:latin typeface="Segoe UI" panose="020B0502040204020203" pitchFamily="34" charset="0"/>
                 <a:cs typeface="Segoe UI" panose="020B0502040204020203" pitchFamily="34" charset="0"/>
               </a:rPr>
-              <a:t>na</a:t>
-            </a:r>
-            <a:r>
-              <a:rPr lang="en-US" dirty="0" smtClean="0">
-                <a:solidFill>
-                  <a:schemeClr val="tx1">
-                    <a:lumMod val="75000"/>
-                    <a:lumOff val="25000"/>
-                  </a:schemeClr>
-                </a:solidFill>
-                <a:latin typeface="Segoe UI" panose="020B0502040204020203" pitchFamily="34" charset="0"/>
-                <a:cs typeface="Segoe UI" panose="020B0502040204020203" pitchFamily="34" charset="0"/>
-              </a:rPr>
-              <a:t> </a:t>
-            </a:r>
-            <a:r>
-              <a:rPr lang="en-US" dirty="0" err="1" smtClean="0">
-                <a:solidFill>
-                  <a:schemeClr val="tx1">
-                    <a:lumMod val="75000"/>
-                    <a:lumOff val="25000"/>
-                  </a:schemeClr>
-                </a:solidFill>
-                <a:latin typeface="Segoe UI" panose="020B0502040204020203" pitchFamily="34" charset="0"/>
-                <a:cs typeface="Segoe UI" panose="020B0502040204020203" pitchFamily="34" charset="0"/>
-              </a:rPr>
-              <a:t>kome</a:t>
-            </a:r>
-            <a:r>
-              <a:rPr lang="en-US" dirty="0" smtClean="0">
-                <a:solidFill>
-                  <a:schemeClr val="tx1">
-                    <a:lumMod val="75000"/>
-                    <a:lumOff val="25000"/>
-                  </a:schemeClr>
-                </a:solidFill>
-                <a:latin typeface="Segoe UI" panose="020B0502040204020203" pitchFamily="34" charset="0"/>
-                <a:cs typeface="Segoe UI" panose="020B0502040204020203" pitchFamily="34" charset="0"/>
-              </a:rPr>
-              <a:t> se </a:t>
-            </a:r>
-            <a:r>
-              <a:rPr lang="en-US" dirty="0" err="1" smtClean="0">
-                <a:solidFill>
-                  <a:schemeClr val="tx1">
-                    <a:lumMod val="75000"/>
-                    <a:lumOff val="25000"/>
-                  </a:schemeClr>
-                </a:solidFill>
-                <a:latin typeface="Segoe UI" panose="020B0502040204020203" pitchFamily="34" charset="0"/>
-                <a:cs typeface="Segoe UI" panose="020B0502040204020203" pitchFamily="34" charset="0"/>
-              </a:rPr>
-              <a:t>izvr</a:t>
-            </a:r>
-            <a:r>
-              <a:rPr lang="sr-Latn-RS" dirty="0" smtClean="0">
-                <a:solidFill>
-                  <a:schemeClr val="tx1">
-                    <a:lumMod val="75000"/>
-                    <a:lumOff val="25000"/>
-                  </a:schemeClr>
-                </a:solidFill>
-                <a:latin typeface="Segoe UI" panose="020B0502040204020203" pitchFamily="34" charset="0"/>
-                <a:cs typeface="Segoe UI" panose="020B0502040204020203" pitchFamily="34" charset="0"/>
-              </a:rPr>
-              <a:t>šava jedna </a:t>
-            </a:r>
-            <a:r>
-              <a:rPr lang="sr-Latn-RS" i="1" dirty="0" smtClean="0">
-                <a:solidFill>
-                  <a:schemeClr val="tx1">
-                    <a:lumMod val="75000"/>
-                    <a:lumOff val="25000"/>
-                  </a:schemeClr>
-                </a:solidFill>
-                <a:latin typeface="Segoe UI" panose="020B0502040204020203" pitchFamily="34" charset="0"/>
-                <a:cs typeface="Segoe UI" panose="020B0502040204020203" pitchFamily="34" charset="0"/>
-              </a:rPr>
-              <a:t>Elasticsearch</a:t>
-            </a:r>
-            <a:r>
-              <a:rPr lang="sr-Latn-RS" dirty="0" smtClean="0">
-                <a:solidFill>
-                  <a:schemeClr val="tx1">
-                    <a:lumMod val="75000"/>
-                    <a:lumOff val="25000"/>
-                  </a:schemeClr>
-                </a:solidFill>
-                <a:latin typeface="Segoe UI" panose="020B0502040204020203" pitchFamily="34" charset="0"/>
-                <a:cs typeface="Segoe UI" panose="020B0502040204020203" pitchFamily="34" charset="0"/>
-              </a:rPr>
-              <a:t> instanca..</a:t>
-            </a:r>
+              <a:t>server</a:t>
+            </a:r>
+            <a:endParaRPr lang="sr-Latn-RS" dirty="0" smtClean="0">
+              <a:solidFill>
+                <a:schemeClr val="tx1">
+                  <a:lumMod val="75000"/>
+                  <a:lumOff val="25000"/>
+                </a:schemeClr>
+              </a:solidFill>
+              <a:latin typeface="Segoe UI" panose="020B0502040204020203" pitchFamily="34" charset="0"/>
+              <a:cs typeface="Segoe UI" panose="020B0502040204020203" pitchFamily="34" charset="0"/>
+            </a:endParaRPr>
           </a:p>
           <a:p>
             <a:pPr marL="285750" indent="-285750">
@@ -7958,6 +7780,32 @@
               <a:buChar char="•"/>
             </a:pPr>
             <a:r>
+              <a:rPr lang="en-US" i="1" dirty="0" smtClean="0">
+                <a:solidFill>
+                  <a:schemeClr val="tx1">
+                    <a:lumMod val="75000"/>
+                    <a:lumOff val="25000"/>
+                  </a:schemeClr>
+                </a:solidFill>
+                <a:latin typeface="Segoe UI" panose="020B0502040204020203" pitchFamily="34" charset="0"/>
+                <a:cs typeface="Segoe UI" panose="020B0502040204020203" pitchFamily="34" charset="0"/>
+              </a:rPr>
+              <a:t>Cluster </a:t>
+            </a:r>
+            <a:r>
+              <a:rPr lang="en-US" dirty="0" smtClean="0">
+                <a:solidFill>
+                  <a:schemeClr val="tx1">
+                    <a:lumMod val="75000"/>
+                    <a:lumOff val="25000"/>
+                  </a:schemeClr>
+                </a:solidFill>
+                <a:latin typeface="Segoe UI" panose="020B0502040204020203" pitchFamily="34" charset="0"/>
+                <a:cs typeface="Segoe UI" panose="020B0502040204020203" pitchFamily="34" charset="0"/>
+              </a:rPr>
+              <a:t>= j</a:t>
+            </a:r>
+            <a:r>
               <a:rPr lang="sr-Latn-RS" dirty="0" smtClean="0">
                 <a:solidFill>
                   <a:schemeClr val="tx1">
@@ -7968,7 +7816,7 @@
                 <a:latin typeface="Segoe UI" panose="020B0502040204020203" pitchFamily="34" charset="0"/>
                 <a:cs typeface="Segoe UI" panose="020B0502040204020203" pitchFamily="34" charset="0"/>
               </a:rPr>
-              <a:t>Jedna ili više povezanih </a:t>
+              <a:t>edna ili više povezanih </a:t>
             </a:r>
             <a:r>
               <a:rPr lang="sr-Latn-RS" i="1" dirty="0" smtClean="0">
@@ -7994,10 +7842,10 @@
                 <a:latin typeface="Segoe UI" panose="020B0502040204020203" pitchFamily="34" charset="0"/>
                 <a:cs typeface="Segoe UI" panose="020B0502040204020203" pitchFamily="34" charset="0"/>
               </a:rPr>
-              <a:t> komponenti </a:t>
-            </a:r>
-            <a:r>
-              <a:rPr lang="en-US" dirty="0" smtClean="0">
+              <a:t> </a:t>
+            </a:r>
+            <a:r>
+              <a:rPr lang="sr-Latn-RS" dirty="0" smtClean="0">
                 <a:solidFill>
                   <a:schemeClr val="tx1">
                     <a:lumMod val="75000"/>
@@ -8007,34 +7855,18 @@
                 <a:latin typeface="Segoe UI" panose="020B0502040204020203" pitchFamily="34" charset="0"/>
                 <a:cs typeface="Segoe UI" panose="020B0502040204020203" pitchFamily="34" charset="0"/>
               </a:rPr>
-              <a:t>= </a:t>
-            </a:r>
-            <a:r>
-              <a:rPr lang="en-US" i="1" dirty="0" smtClean="0">
-                <a:solidFill>
-                  <a:schemeClr val="tx1">
-                    <a:lumMod val="75000"/>
-                    <a:lumOff val="25000"/>
-                  </a:schemeClr>
-                </a:solidFill>
-                <a:latin typeface="Segoe UI" panose="020B0502040204020203" pitchFamily="34" charset="0"/>
-                <a:cs typeface="Segoe UI" panose="020B0502040204020203" pitchFamily="34" charset="0"/>
-              </a:rPr>
-              <a:t>cluster</a:t>
-            </a:r>
-            <a:r>
-              <a:rPr lang="en-US" dirty="0" smtClean="0">
-                <a:solidFill>
-                  <a:schemeClr val="tx1">
-                    <a:lumMod val="75000"/>
-                    <a:lumOff val="25000"/>
-                  </a:schemeClr>
-                </a:solidFill>
-                <a:latin typeface="Segoe UI" panose="020B0502040204020203" pitchFamily="34" charset="0"/>
-                <a:cs typeface="Segoe UI" panose="020B0502040204020203" pitchFamily="34" charset="0"/>
-              </a:rPr>
-              <a:t>.</a:t>
-            </a:r>
+              <a:t>komponenti</a:t>
+            </a:r>
+            <a:endParaRPr lang="en-US" dirty="0" smtClean="0">
+              <a:solidFill>
+                <a:schemeClr val="tx1">
+                  <a:lumMod val="75000"/>
+                  <a:lumOff val="25000"/>
+                </a:schemeClr>
+              </a:solidFill>
+              <a:latin typeface="Segoe UI" panose="020B0502040204020203" pitchFamily="34" charset="0"/>
+              <a:cs typeface="Segoe UI" panose="020B0502040204020203" pitchFamily="34" charset="0"/>
+            </a:endParaRPr>
           </a:p>
           <a:p>
             <a:pPr marL="285750" indent="-285750">
@@ -8068,7 +7900,33 @@
                 <a:latin typeface="Segoe UI" panose="020B0502040204020203" pitchFamily="34" charset="0"/>
                 <a:cs typeface="Segoe UI" panose="020B0502040204020203" pitchFamily="34" charset="0"/>
               </a:rPr>
-              <a:t> node </a:t>
+              <a:t> </a:t>
+            </a:r>
+            <a:r>
+              <a:rPr lang="en-US" i="1" dirty="0" smtClean="0">
+                <a:solidFill>
+                  <a:schemeClr val="tx1">
+                    <a:lumMod val="75000"/>
+                    <a:lumOff val="25000"/>
+                  </a:schemeClr>
+                </a:solidFill>
+                <a:latin typeface="Segoe UI" panose="020B0502040204020203" pitchFamily="34" charset="0"/>
+                <a:cs typeface="Segoe UI" panose="020B0502040204020203" pitchFamily="34" charset="0"/>
+              </a:rPr>
+              <a:t>node</a:t>
+            </a:r>
+            <a:r>
+              <a:rPr lang="en-US" dirty="0" smtClean="0">
+                <a:solidFill>
+                  <a:schemeClr val="tx1">
+                    <a:lumMod val="75000"/>
+                    <a:lumOff val="25000"/>
+                  </a:schemeClr>
+                </a:solidFill>
+                <a:latin typeface="Segoe UI" panose="020B0502040204020203" pitchFamily="34" charset="0"/>
+                <a:cs typeface="Segoe UI" panose="020B0502040204020203" pitchFamily="34" charset="0"/>
+              </a:rPr>
+              <a:t> </a:t>
             </a:r>
             <a:r>
               <a:rPr lang="en-US" dirty="0" err="1" smtClean="0">
@@ -8094,17 +7952,21 @@
                 <a:latin typeface="Segoe UI" panose="020B0502040204020203" pitchFamily="34" charset="0"/>
                 <a:cs typeface="Segoe UI" panose="020B0502040204020203" pitchFamily="34" charset="0"/>
               </a:rPr>
-              <a:t>:</a:t>
-            </a:r>
-          </a:p>
-          <a:p>
-            <a:pPr marL="800100" lvl="1" indent="-342900">
-              <a:lnSpc>
-                <a:spcPct val="150000"/>
-              </a:lnSpc>
-              <a:buFont typeface="+mj-lt"/>
-              <a:buAutoNum type="arabicPeriod"/>
-            </a:pPr>
+              <a:t>: </a:t>
+            </a:r>
+            <a:r>
+              <a:rPr lang="en-US" i="1" dirty="0" smtClean="0">
+                <a:solidFill>
+                  <a:schemeClr val="tx1">
+                    <a:lumMod val="75000"/>
+                    <a:lumOff val="25000"/>
+                  </a:schemeClr>
+                </a:solidFill>
+                <a:latin typeface="Segoe UI" panose="020B0502040204020203" pitchFamily="34" charset="0"/>
+                <a:cs typeface="Segoe UI" panose="020B0502040204020203" pitchFamily="34" charset="0"/>
+              </a:rPr>
+              <a:t>master-eligible node, </a:t>
+            </a:r>
             <a:r>
               <a:rPr lang="en-US" i="1" dirty="0">
                 <a:solidFill>
@@ -8116,7 +7978,7 @@
                 <a:latin typeface="Segoe UI" panose="020B0502040204020203" pitchFamily="34" charset="0"/>
                 <a:cs typeface="Segoe UI" panose="020B0502040204020203" pitchFamily="34" charset="0"/>
               </a:rPr>
-              <a:t>m</a:t>
+              <a:t>data </a:t>
             </a:r>
             <a:r>
               <a:rPr lang="en-US" i="1" dirty="0" smtClean="0">
@@ -8129,17 +7991,8 @@
                 <a:latin typeface="Segoe UI" panose="020B0502040204020203" pitchFamily="34" charset="0"/>
                 <a:cs typeface="Segoe UI" panose="020B0502040204020203" pitchFamily="34" charset="0"/>
               </a:rPr>
-              <a:t>aster-eligible node</a:t>
-            </a:r>
-          </a:p>
-          <a:p>
-            <a:pPr marL="800100" lvl="1" indent="-342900">
-              <a:lnSpc>
-                <a:spcPct val="150000"/>
-              </a:lnSpc>
-              <a:buFont typeface="+mj-lt"/>
-              <a:buAutoNum type="arabicPeriod"/>
-            </a:pPr>
+              <a:t>node, </a:t>
+            </a:r>
             <a:r>
               <a:rPr lang="en-US" i="1" dirty="0">
                 <a:solidFill>
@@ -8151,7 +8004,7 @@
                 <a:latin typeface="Segoe UI" panose="020B0502040204020203" pitchFamily="34" charset="0"/>
                 <a:cs typeface="Segoe UI" panose="020B0502040204020203" pitchFamily="34" charset="0"/>
               </a:rPr>
-              <a:t>d</a:t>
+              <a:t>ingest </a:t>
             </a:r>
             <a:r>
               <a:rPr lang="en-US" i="1" dirty="0" smtClean="0">
@@ -8164,17 +8017,8 @@
                 <a:latin typeface="Segoe UI" panose="020B0502040204020203" pitchFamily="34" charset="0"/>
                 <a:cs typeface="Segoe UI" panose="020B0502040204020203" pitchFamily="34" charset="0"/>
               </a:rPr>
-              <a:t>ata node</a:t>
-            </a:r>
-          </a:p>
-          <a:p>
-            <a:pPr marL="800100" lvl="1" indent="-342900">
-              <a:lnSpc>
-                <a:spcPct val="150000"/>
-              </a:lnSpc>
-              <a:buFont typeface="+mj-lt"/>
-              <a:buAutoNum type="arabicPeriod"/>
-            </a:pPr>
+              <a:t>node, </a:t>
+            </a:r>
             <a:r>
               <a:rPr lang="en-US" i="1" dirty="0">
                 <a:solidFill>
@@ -8186,7 +8030,7 @@
                 <a:latin typeface="Segoe UI" panose="020B0502040204020203" pitchFamily="34" charset="0"/>
                 <a:cs typeface="Segoe UI" panose="020B0502040204020203" pitchFamily="34" charset="0"/>
               </a:rPr>
-              <a:t>i</a:t>
+              <a:t>remote-eligible </a:t>
             </a:r>
             <a:r>
               <a:rPr lang="en-US" i="1" dirty="0" smtClean="0">
@@ -8199,17 +8043,21 @@
                 <a:latin typeface="Segoe UI" panose="020B0502040204020203" pitchFamily="34" charset="0"/>
                 <a:cs typeface="Segoe UI" panose="020B0502040204020203" pitchFamily="34" charset="0"/>
               </a:rPr>
-              <a:t>ngest node</a:t>
-            </a:r>
-          </a:p>
-          <a:p>
-            <a:pPr marL="800100" lvl="1" indent="-342900">
-              <a:lnSpc>
-                <a:spcPct val="150000"/>
-              </a:lnSpc>
-              <a:buFont typeface="+mj-lt"/>
-              <a:buAutoNum type="arabicPeriod"/>
-            </a:pPr>
+              <a:t>node, machine-learning node, </a:t>
+            </a:r>
+            <a:r>
+              <a:rPr lang="en-US" i="1" dirty="0">
+                <a:solidFill>
+                  <a:schemeClr val="tx1">
+                    <a:lumMod val="75000"/>
+                    <a:lumOff val="25000"/>
+                  </a:schemeClr>
+                </a:solidFill>
+                <a:latin typeface="Segoe UI" panose="020B0502040204020203" pitchFamily="34" charset="0"/>
+                <a:cs typeface="Segoe UI" panose="020B0502040204020203" pitchFamily="34" charset="0"/>
+              </a:rPr>
+              <a:t>transform </a:t>
+            </a:r>
             <a:r>
               <a:rPr lang="en-US" i="1" dirty="0" smtClean="0">
                 <a:solidFill>
@@ -8221,17 +8069,21 @@
                 <a:latin typeface="Segoe UI" panose="020B0502040204020203" pitchFamily="34" charset="0"/>
                 <a:cs typeface="Segoe UI" panose="020B0502040204020203" pitchFamily="34" charset="0"/>
               </a:rPr>
-              <a:t>remote-eligible node</a:t>
-            </a:r>
-          </a:p>
-          <a:p>
-            <a:pPr marL="800100" lvl="1" indent="-342900">
-              <a:lnSpc>
-                <a:spcPct val="150000"/>
-              </a:lnSpc>
-              <a:buFont typeface="+mj-lt"/>
-              <a:buAutoNum type="arabicPeriod"/>
-            </a:pPr>
+              <a:t>node, </a:t>
+            </a:r>
+            <a:r>
+              <a:rPr lang="en-US" i="1" dirty="0">
+                <a:solidFill>
+                  <a:schemeClr val="tx1">
+                    <a:lumMod val="75000"/>
+                    <a:lumOff val="25000"/>
+                  </a:schemeClr>
+                </a:solidFill>
+                <a:latin typeface="Segoe UI" panose="020B0502040204020203" pitchFamily="34" charset="0"/>
+                <a:cs typeface="Segoe UI" panose="020B0502040204020203" pitchFamily="34" charset="0"/>
+              </a:rPr>
+              <a:t>coordinating </a:t>
+            </a:r>
             <a:r>
               <a:rPr lang="en-US" i="1" dirty="0" smtClean="0">
                 <a:solidFill>
@@ -8243,75 +8095,16 @@
                 <a:latin typeface="Segoe UI" panose="020B0502040204020203" pitchFamily="34" charset="0"/>
                 <a:cs typeface="Segoe UI" panose="020B0502040204020203" pitchFamily="34" charset="0"/>
               </a:rPr>
-              <a:t>machine-learning node</a:t>
-            </a:r>
-          </a:p>
-          <a:p>
-            <a:pPr marL="800100" lvl="1" indent="-342900">
-              <a:lnSpc>
-                <a:spcPct val="150000"/>
-              </a:lnSpc>
-              <a:buFont typeface="+mj-lt"/>
-              <a:buAutoNum type="arabicPeriod"/>
-            </a:pPr>
-            <a:r>
-              <a:rPr lang="en-US" i="1" dirty="0" smtClean="0">
-                <a:solidFill>
-                  <a:schemeClr val="tx1">
-                    <a:lumMod val="75000"/>
-                    <a:lumOff val="25000"/>
-                  </a:schemeClr>
-                </a:solidFill>
-                <a:latin typeface="Segoe UI" panose="020B0502040204020203" pitchFamily="34" charset="0"/>
-                <a:cs typeface="Segoe UI" panose="020B0502040204020203" pitchFamily="34" charset="0"/>
-              </a:rPr>
-              <a:t>transform node</a:t>
-            </a:r>
-          </a:p>
-          <a:p>
-            <a:pPr marL="800100" lvl="1" indent="-342900">
-              <a:lnSpc>
-                <a:spcPct val="150000"/>
-              </a:lnSpc>
-              <a:buFont typeface="+mj-lt"/>
-              <a:buAutoNum type="arabicPeriod"/>
-            </a:pPr>
-            <a:r>
-              <a:rPr lang="en-US" i="1" dirty="0" smtClean="0">
-                <a:solidFill>
-                  <a:schemeClr val="tx1">
-                    <a:lumMod val="75000"/>
-                    <a:lumOff val="25000"/>
-                  </a:schemeClr>
-                </a:solidFill>
-                <a:latin typeface="Segoe UI" panose="020B0502040204020203" pitchFamily="34" charset="0"/>
-                <a:cs typeface="Segoe UI" panose="020B0502040204020203" pitchFamily="34" charset="0"/>
-              </a:rPr>
-              <a:t>coordinating node</a:t>
-            </a:r>
-            <a:endParaRPr lang="en-US" i="1" dirty="0">
+              <a:t>node</a:t>
+            </a:r>
+            <a:endParaRPr lang="en-US" dirty="0" smtClean="0">
               <a:solidFill>
                 <a:schemeClr val="tx1">
                   <a:lumMod val="75000"/>
                   <a:lumOff val="25000"/>
                 </a:schemeClr>
               </a:solidFill>
-              <a:cs typeface="Segoe UI" panose="020B0502040204020203" pitchFamily="34" charset="0"/>
-            </a:endParaRPr>
-          </a:p>
-          <a:p>
-            <a:pPr>
-              <a:lnSpc>
-                <a:spcPts val="1900"/>
-              </a:lnSpc>
-            </a:pPr>
-            <a:endParaRPr lang="en-US" i="1" dirty="0">
-              <a:solidFill>
-                <a:schemeClr val="tx1">
-                  <a:lumMod val="75000"/>
-                  <a:lumOff val="25000"/>
-                </a:schemeClr>
-              </a:solidFill>
+              <a:latin typeface="Segoe UI" panose="020B0502040204020203" pitchFamily="34" charset="0"/>
               <a:cs typeface="Segoe UI" panose="020B0502040204020203" pitchFamily="34" charset="0"/>
             </a:endParaRPr>
           </a:p>
@@ -8372,8 +8165,8 @@
         </p:blipFill>
         <p:spPr>
           <a:xfrm>
-            <a:off x="3674423" y="4404087"/>
-            <a:ext cx="8288977" cy="2279469"/>
+            <a:off x="1181212" y="3733526"/>
+            <a:ext cx="9829575" cy="2703133"/>
           </a:xfrm>
           <a:prstGeom prst="rect">
             <a:avLst/>
@@ -8813,7 +8606,20 @@
                 <a:latin typeface="Segoe UI" panose="020B0502040204020203" pitchFamily="34" charset="0"/>
                 <a:cs typeface="Segoe UI" panose="020B0502040204020203" pitchFamily="34" charset="0"/>
               </a:rPr>
-              <a:t>Postoje dva tipa za data mapping</a:t>
+              <a:t>Postoje dva tipa za </a:t>
+            </a:r>
+            <a:r>
+              <a:rPr lang="sr-Latn-RS" i="1" dirty="0" smtClean="0">
+                <a:solidFill>
+                  <a:schemeClr val="tx1">
+                    <a:lumMod val="75000"/>
+                    <a:lumOff val="25000"/>
+                  </a:schemeClr>
+                </a:solidFill>
+                <a:latin typeface="Segoe UI" panose="020B0502040204020203" pitchFamily="34" charset="0"/>
+                <a:cs typeface="Segoe UI" panose="020B0502040204020203" pitchFamily="34" charset="0"/>
+              </a:rPr>
+              <a:t>data mapping</a:t>
             </a:r>
             <a:r>
               <a:rPr lang="en-US" dirty="0" smtClean="0">
@@ -9567,8 +9373,57 @@
                 <a:latin typeface="Segoe UI" panose="020B0502040204020203" pitchFamily="34" charset="0"/>
                 <a:cs typeface="Segoe UI" panose="020B0502040204020203" pitchFamily="34" charset="0"/>
               </a:rPr>
-              <a:t>Tipovi upita, odnosno pretraga:</a:t>
-            </a:r>
+              <a:t>Tipovi </a:t>
+            </a:r>
+            <a:r>
+              <a:rPr lang="sr-Latn-RS" dirty="0" smtClean="0">
+                <a:solidFill>
+                  <a:schemeClr val="tx1">
+                    <a:lumMod val="75000"/>
+                    <a:lumOff val="25000"/>
+                  </a:schemeClr>
+                </a:solidFill>
+                <a:latin typeface="Segoe UI" panose="020B0502040204020203" pitchFamily="34" charset="0"/>
+                <a:cs typeface="Segoe UI" panose="020B0502040204020203" pitchFamily="34" charset="0"/>
+              </a:rPr>
+              <a:t>upita, </a:t>
+            </a:r>
+            <a:r>
+              <a:rPr lang="sr-Latn-RS" dirty="0" smtClean="0">
+                <a:solidFill>
+                  <a:schemeClr val="tx1">
+                    <a:lumMod val="75000"/>
+                    <a:lumOff val="25000"/>
+                  </a:schemeClr>
+                </a:solidFill>
+                <a:latin typeface="Segoe UI" panose="020B0502040204020203" pitchFamily="34" charset="0"/>
+                <a:cs typeface="Segoe UI" panose="020B0502040204020203" pitchFamily="34" charset="0"/>
+              </a:rPr>
+              <a:t>odnosno </a:t>
+            </a:r>
+            <a:r>
+              <a:rPr lang="sr-Latn-RS" dirty="0" smtClean="0">
+                <a:solidFill>
+                  <a:schemeClr val="tx1">
+                    <a:lumMod val="75000"/>
+                    <a:lumOff val="25000"/>
+                  </a:schemeClr>
+                </a:solidFill>
+                <a:latin typeface="Segoe UI" panose="020B0502040204020203" pitchFamily="34" charset="0"/>
+                <a:cs typeface="Segoe UI" panose="020B0502040204020203" pitchFamily="34" charset="0"/>
+              </a:rPr>
+              <a:t>pretraga:</a:t>
+            </a:r>
+            <a:endParaRPr lang="sr-Latn-RS" dirty="0" smtClean="0">
+              <a:solidFill>
+                <a:schemeClr val="tx1">
+                  <a:lumMod val="75000"/>
+                  <a:lumOff val="25000"/>
+                </a:schemeClr>
+              </a:solidFill>
+              <a:latin typeface="Segoe UI" panose="020B0502040204020203" pitchFamily="34" charset="0"/>
+              <a:cs typeface="Segoe UI" panose="020B0502040204020203" pitchFamily="34" charset="0"/>
+            </a:endParaRPr>
           </a:p>
           <a:p>
             <a:pPr marL="800100" lvl="1" indent="-342900">
@@ -9698,20 +9553,7 @@
                 <a:latin typeface="Segoe UI" panose="020B0502040204020203" pitchFamily="34" charset="0"/>
                 <a:cs typeface="Segoe UI" panose="020B0502040204020203" pitchFamily="34" charset="0"/>
               </a:rPr>
-              <a:t>eng. </a:t>
-            </a:r>
-            <a:r>
-              <a:rPr lang="sr-Latn-RS" i="1" dirty="0" smtClean="0">
-                <a:solidFill>
-                  <a:schemeClr val="tx1">
-                    <a:lumMod val="75000"/>
-                    <a:lumOff val="25000"/>
-                  </a:schemeClr>
-                </a:solidFill>
-                <a:latin typeface="Segoe UI" panose="020B0502040204020203" pitchFamily="34" charset="0"/>
-                <a:cs typeface="Segoe UI" panose="020B0502040204020203" pitchFamily="34" charset="0"/>
-              </a:rPr>
-              <a:t>combining queries</a:t>
+              <a:t>eng. combining queries</a:t>
             </a:r>
             <a:r>
               <a:rPr lang="sr-Latn-RS" dirty="0" smtClean="0">
@@ -9917,14 +9759,6 @@
               </a:rPr>
               <a:t>Text analysis</a:t>
             </a:r>
-            <a:endParaRPr lang="sr-Latn-RS" sz="2800" b="1" i="1" dirty="0" smtClean="0">
-              <a:solidFill>
-                <a:schemeClr val="tx1">
-                  <a:lumMod val="75000"/>
-                  <a:lumOff val="25000"/>
-                </a:schemeClr>
-              </a:solidFill>
-            </a:endParaRPr>
           </a:p>
         </p:txBody>
       </p:sp>
@@ -10234,16 +10068,6 @@
               </a:rPr>
               <a:t>token filters</a:t>
             </a:r>
-            <a:endParaRPr lang="sr-Latn-RS" i="1" dirty="0" smtClean="0">
-              <a:solidFill>
-                <a:schemeClr val="tx1">
-                  <a:lumMod val="75000"/>
-                  <a:lumOff val="25000"/>
-                </a:schemeClr>
-              </a:solidFill>
-              <a:latin typeface="Segoe UI" panose="020B0502040204020203" pitchFamily="34" charset="0"/>
-              <a:cs typeface="Segoe UI" panose="020B0502040204020203" pitchFamily="34" charset="0"/>
-            </a:endParaRPr>
           </a:p>
         </p:txBody>
       </p:sp>
@@ -11246,7 +11070,7 @@
               <a:t> (</a:t>
             </a:r>
             <a:r>
-              <a:rPr lang="sr-Latn-RS" sz="1400" b="1" i="1" dirty="0" smtClean="0">
+              <a:rPr lang="sr-Latn-RS" sz="1400" i="1" dirty="0" smtClean="0">
                 <a:solidFill>
                   <a:schemeClr val="tx1">
                     <a:lumMod val="75000"/>
@@ -11307,7 +11131,7 @@
               <a:t> (</a:t>
             </a:r>
             <a:r>
-              <a:rPr lang="sr-Latn-RS" sz="1400" b="1" i="1" dirty="0" smtClean="0">
+              <a:rPr lang="sr-Latn-RS" sz="1400" i="1" dirty="0" smtClean="0">
                 <a:solidFill>
                   <a:schemeClr val="tx1">
                     <a:lumMod val="75000"/>
@@ -11469,8 +11293,8 @@
         </p:nvSpPr>
         <p:spPr>
           <a:xfrm>
-            <a:off x="4779759" y="2857677"/>
-            <a:ext cx="1051335" cy="363882"/>
+            <a:off x="4751777" y="2854138"/>
+            <a:ext cx="1095275" cy="415498"/>
           </a:xfrm>
           <a:prstGeom prst="rect">
             <a:avLst/>
@@ -11488,7 +11312,7 @@
               </a:lnSpc>
             </a:pPr>
             <a:r>
-              <a:rPr lang="sr-Latn-RS" i="1" dirty="0" smtClean="0">
+              <a:rPr lang="sr-Latn-RS" b="1" i="1" dirty="0" smtClean="0">
                 <a:solidFill>
                   <a:schemeClr val="tx1">
                     <a:lumMod val="75000"/>
@@ -11517,8 +11341,8 @@
         </p:nvSpPr>
         <p:spPr>
           <a:xfrm>
-            <a:off x="6189555" y="2856750"/>
-            <a:ext cx="1051335" cy="363882"/>
+            <a:off x="6166136" y="2854138"/>
+            <a:ext cx="1095275" cy="415498"/>
           </a:xfrm>
           <a:prstGeom prst="rect">
             <a:avLst/>
@@ -11536,7 +11360,7 @@
               </a:lnSpc>
             </a:pPr>
             <a:r>
-              <a:rPr lang="sr-Latn-RS" i="1" dirty="0" smtClean="0">
+              <a:rPr lang="sr-Latn-RS" b="1" i="1" dirty="0" smtClean="0">
                 <a:solidFill>
                   <a:schemeClr val="tx1">
                     <a:lumMod val="75000"/>
@@ -11565,8 +11389,8 @@
         </p:nvSpPr>
         <p:spPr>
           <a:xfrm>
-            <a:off x="4074862" y="4094986"/>
-            <a:ext cx="1051335" cy="363882"/>
+            <a:off x="4062861" y="4094986"/>
+            <a:ext cx="1063314" cy="415498"/>
           </a:xfrm>
           <a:prstGeom prst="rect">
             <a:avLst/>
@@ -11584,7 +11408,7 @@
               </a:lnSpc>
             </a:pPr>
             <a:r>
-              <a:rPr lang="sr-Latn-RS" i="1" dirty="0" smtClean="0">
+              <a:rPr lang="sr-Latn-RS" b="1" i="1" dirty="0" smtClean="0">
                 <a:solidFill>
                   <a:schemeClr val="tx1">
                     <a:lumMod val="75000"/>
@@ -11613,7 +11437,7 @@
         </p:nvSpPr>
         <p:spPr>
           <a:xfrm>
-            <a:off x="5636232" y="4094986"/>
+            <a:off x="5605543" y="4086726"/>
             <a:ext cx="797538" cy="363882"/>
           </a:xfrm>
           <a:prstGeom prst="rect">
@@ -11632,7 +11456,7 @@
               </a:lnSpc>
             </a:pPr>
             <a:r>
-              <a:rPr lang="sr-Latn-RS" i="1" dirty="0" smtClean="0">
+              <a:rPr lang="sr-Latn-RS" b="1" i="1" dirty="0" smtClean="0">
                 <a:solidFill>
                   <a:schemeClr val="tx1">
                     <a:lumMod val="75000"/>
@@ -11675,7 +11499,7 @@
           <a:lstStyle/>
           <a:p>
             <a:r>
-              <a:rPr lang="sr-Latn-RS" i="1" dirty="0" smtClean="0">
+              <a:rPr lang="sr-Latn-RS" b="1" i="1" dirty="0" smtClean="0">
                 <a:solidFill>
                   <a:schemeClr val="tx1">
                     <a:lumMod val="75000"/>
@@ -11690,7 +11514,7 @@
           </a:p>
           <a:p>
             <a:r>
-              <a:rPr lang="sr-Latn-RS" i="1" dirty="0" smtClean="0">
+              <a:rPr lang="sr-Latn-RS" b="1" i="1" dirty="0" smtClean="0">
                 <a:solidFill>
                   <a:schemeClr val="tx1">
                     <a:lumMod val="75000"/>
@@ -11850,14 +11674,6 @@
               </a:rPr>
               <a:t>DebugIt</a:t>
             </a:r>
-            <a:endParaRPr lang="sr-Latn-RS" sz="2800" b="1" i="1" dirty="0" smtClean="0">
-              <a:solidFill>
-                <a:schemeClr val="tx1">
-                  <a:lumMod val="75000"/>
-                  <a:lumOff val="25000"/>
-                </a:schemeClr>
-              </a:solidFill>
-            </a:endParaRPr>
           </a:p>
         </p:txBody>
       </p:sp>
@@ -12181,14 +11997,6 @@
               </a:rPr>
               <a:t>DebugIt</a:t>
             </a:r>
-            <a:endParaRPr lang="sr-Latn-RS" sz="2800" b="1" i="1" dirty="0" smtClean="0">
-              <a:solidFill>
-                <a:schemeClr val="tx1">
-                  <a:lumMod val="75000"/>
-                  <a:lumOff val="25000"/>
-                </a:schemeClr>
-              </a:solidFill>
-            </a:endParaRPr>
           </a:p>
         </p:txBody>
       </p:sp>
@@ -12488,14 +12296,6 @@
               </a:rPr>
               <a:t>DebugIt</a:t>
             </a:r>
-            <a:endParaRPr lang="sr-Latn-RS" sz="2800" b="1" i="1" dirty="0" smtClean="0">
-              <a:solidFill>
-                <a:schemeClr val="tx1">
-                  <a:lumMod val="75000"/>
-                  <a:lumOff val="25000"/>
-                </a:schemeClr>
-              </a:solidFill>
-            </a:endParaRPr>
           </a:p>
         </p:txBody>
       </p:sp>
@@ -12640,7 +12440,7 @@
         </p:blipFill>
         <p:spPr>
           <a:xfrm>
-            <a:off x="1513114" y="1145182"/>
+            <a:off x="1513114" y="1580610"/>
             <a:ext cx="8889326" cy="4268016"/>
           </a:xfrm>
           <a:prstGeom prst="rect">
@@ -12793,14 +12593,6 @@
               </a:rPr>
               <a:t>DebugIt</a:t>
             </a:r>
-            <a:endParaRPr lang="sr-Latn-RS" sz="2800" b="1" i="1" dirty="0" smtClean="0">
-              <a:solidFill>
-                <a:schemeClr val="tx1">
-                  <a:lumMod val="75000"/>
-                  <a:lumOff val="25000"/>
-                </a:schemeClr>
-              </a:solidFill>
-            </a:endParaRPr>
           </a:p>
         </p:txBody>
       </p:sp>
@@ -13437,7 +13229,19 @@
                 </a:solidFill>
                 <a:cs typeface="Segoe UI" panose="020B0502040204020203" pitchFamily="34" charset="0"/>
               </a:rPr>
-              <a:t>Emtage</a:t>
+              <a:t>Emti</a:t>
+            </a:r>
+            <a:r>
+              <a:rPr lang="sr-Latn-RS" sz="1400" dirty="0" smtClean="0">
+                <a:solidFill>
+                  <a:schemeClr val="tx1">
+                    <a:lumMod val="75000"/>
+                    <a:lumOff val="25000"/>
+                  </a:schemeClr>
+                </a:solidFill>
+                <a:cs typeface="Segoe UI" panose="020B0502040204020203" pitchFamily="34" charset="0"/>
+              </a:rPr>
+              <a:t>dž</a:t>
             </a:r>
             <a:r>
               <a:rPr lang="en-US" sz="1400" dirty="0" smtClean="0">
@@ -13793,6 +13597,18 @@
               </a:lnSpc>
             </a:pPr>
             <a:r>
+              <a:rPr lang="sr-Latn-RS" sz="1400" dirty="0" smtClean="0">
+                <a:solidFill>
+                  <a:schemeClr val="tx1">
+                    <a:lumMod val="75000"/>
+                    <a:lumOff val="25000"/>
+                  </a:schemeClr>
+                </a:solidFill>
+                <a:cs typeface="Segoe UI" panose="020B0502040204020203" pitchFamily="34" charset="0"/>
+              </a:rPr>
+              <a:t>Leri</a:t>
+            </a:r>
+            <a:r>
               <a:rPr lang="en-US" sz="1400" dirty="0" smtClean="0">
                 <a:solidFill>
                   <a:schemeClr val="tx1">
@@ -13802,7 +13618,31 @@
                 </a:solidFill>
                 <a:cs typeface="Segoe UI" panose="020B0502040204020203" pitchFamily="34" charset="0"/>
               </a:rPr>
-              <a:t>Larry Page </a:t>
+              <a:t> </a:t>
+            </a:r>
+            <a:r>
+              <a:rPr lang="sr-Latn-RS" sz="1400" dirty="0" smtClean="0">
+                <a:solidFill>
+                  <a:schemeClr val="tx1">
+                    <a:lumMod val="75000"/>
+                    <a:lumOff val="25000"/>
+                  </a:schemeClr>
+                </a:solidFill>
+                <a:cs typeface="Segoe UI" panose="020B0502040204020203" pitchFamily="34" charset="0"/>
+              </a:rPr>
+              <a:t>Pejdž</a:t>
+            </a:r>
+            <a:r>
+              <a:rPr lang="en-US" sz="1400" dirty="0" smtClean="0">
+                <a:solidFill>
+                  <a:schemeClr val="tx1">
+                    <a:lumMod val="75000"/>
+                    <a:lumOff val="25000"/>
+                  </a:schemeClr>
+                </a:solidFill>
+                <a:cs typeface="Segoe UI" panose="020B0502040204020203" pitchFamily="34" charset="0"/>
+              </a:rPr>
+              <a:t> </a:t>
             </a:r>
             <a:r>
               <a:rPr lang="en-US" sz="1400" dirty="0" err="1" smtClean="0">
@@ -13826,7 +13666,31 @@
                 </a:solidFill>
                 <a:cs typeface="Segoe UI" panose="020B0502040204020203" pitchFamily="34" charset="0"/>
               </a:rPr>
-              <a:t> Sergey </a:t>
+              <a:t> </a:t>
+            </a:r>
+            <a:r>
+              <a:rPr lang="sr-Latn-RS" sz="1400" dirty="0" smtClean="0">
+                <a:solidFill>
+                  <a:schemeClr val="tx1">
+                    <a:lumMod val="75000"/>
+                    <a:lumOff val="25000"/>
+                  </a:schemeClr>
+                </a:solidFill>
+                <a:cs typeface="Segoe UI" panose="020B0502040204020203" pitchFamily="34" charset="0"/>
+              </a:rPr>
+              <a:t>Sergej</a:t>
+            </a:r>
+            <a:r>
+              <a:rPr lang="en-US" sz="1400" dirty="0" smtClean="0">
+                <a:solidFill>
+                  <a:schemeClr val="tx1">
+                    <a:lumMod val="75000"/>
+                    <a:lumOff val="25000"/>
+                  </a:schemeClr>
+                </a:solidFill>
+                <a:cs typeface="Segoe UI" panose="020B0502040204020203" pitchFamily="34" charset="0"/>
+              </a:rPr>
+              <a:t> </a:t>
             </a:r>
             <a:r>
               <a:rPr lang="en-US" sz="1400" dirty="0" err="1" smtClean="0">
@@ -13850,7 +13714,55 @@
                 </a:solidFill>
                 <a:cs typeface="Segoe UI" panose="020B0502040204020203" pitchFamily="34" charset="0"/>
               </a:rPr>
-              <a:t>, student Stanford </a:t>
+              <a:t>, </a:t>
+            </a:r>
+            <a:r>
+              <a:rPr lang="en-US" sz="1400" dirty="0" smtClean="0">
+                <a:solidFill>
+                  <a:schemeClr val="tx1">
+                    <a:lumMod val="75000"/>
+                    <a:lumOff val="25000"/>
+                  </a:schemeClr>
+                </a:solidFill>
+                <a:cs typeface="Segoe UI" panose="020B0502040204020203" pitchFamily="34" charset="0"/>
+              </a:rPr>
+              <a:t>student</a:t>
+            </a:r>
+            <a:r>
+              <a:rPr lang="sr-Latn-RS" sz="1400" dirty="0" smtClean="0">
+                <a:solidFill>
+                  <a:schemeClr val="tx1">
+                    <a:lumMod val="75000"/>
+                    <a:lumOff val="25000"/>
+                  </a:schemeClr>
+                </a:solidFill>
+                <a:cs typeface="Segoe UI" panose="020B0502040204020203" pitchFamily="34" charset="0"/>
+              </a:rPr>
+              <a:t>i</a:t>
+            </a:r>
+            <a:r>
+              <a:rPr lang="en-US" sz="1400" dirty="0" smtClean="0">
+                <a:solidFill>
+                  <a:schemeClr val="tx1">
+                    <a:lumMod val="75000"/>
+                    <a:lumOff val="25000"/>
+                  </a:schemeClr>
+                </a:solidFill>
+                <a:cs typeface="Segoe UI" panose="020B0502040204020203" pitchFamily="34" charset="0"/>
+              </a:rPr>
+              <a:t> </a:t>
+            </a:r>
+            <a:r>
+              <a:rPr lang="en-US" sz="1400" dirty="0" smtClean="0">
+                <a:solidFill>
+                  <a:schemeClr val="tx1">
+                    <a:lumMod val="75000"/>
+                    <a:lumOff val="25000"/>
+                  </a:schemeClr>
+                </a:solidFill>
+                <a:cs typeface="Segoe UI" panose="020B0502040204020203" pitchFamily="34" charset="0"/>
+              </a:rPr>
+              <a:t>Stanford </a:t>
             </a:r>
             <a:r>
               <a:rPr lang="en-US" sz="1400" dirty="0" err="1" smtClean="0">
@@ -14014,6 +13926,18 @@
               </a:lnSpc>
             </a:pPr>
             <a:r>
+              <a:rPr lang="sr-Latn-RS" sz="1400" dirty="0" smtClean="0">
+                <a:solidFill>
+                  <a:schemeClr val="tx1">
+                    <a:lumMod val="75000"/>
+                    <a:lumOff val="25000"/>
+                  </a:schemeClr>
+                </a:solidFill>
+                <a:cs typeface="Segoe UI" panose="020B0502040204020203" pitchFamily="34" charset="0"/>
+              </a:rPr>
+              <a:t>Džeri</a:t>
+            </a:r>
+            <a:r>
               <a:rPr lang="en-US" sz="1400" dirty="0" smtClean="0">
                 <a:solidFill>
                   <a:schemeClr val="tx1">
@@ -14023,7 +13947,7 @@
                 </a:solidFill>
                 <a:cs typeface="Segoe UI" panose="020B0502040204020203" pitchFamily="34" charset="0"/>
               </a:rPr>
-              <a:t>Jerry Jang </a:t>
+              <a:t> Jang </a:t>
             </a:r>
             <a:r>
               <a:rPr lang="en-US" sz="1400" dirty="0" err="1" smtClean="0">
@@ -14047,7 +13971,79 @@
                 </a:solidFill>
                 <a:cs typeface="Segoe UI" panose="020B0502040204020203" pitchFamily="34" charset="0"/>
               </a:rPr>
-              <a:t> David Filo, student Stanford </a:t>
+              <a:t> </a:t>
+            </a:r>
+            <a:r>
+              <a:rPr lang="sr-Latn-RS" sz="1400" dirty="0" smtClean="0">
+                <a:solidFill>
+                  <a:schemeClr val="tx1">
+                    <a:lumMod val="75000"/>
+                    <a:lumOff val="25000"/>
+                  </a:schemeClr>
+                </a:solidFill>
+                <a:cs typeface="Segoe UI" panose="020B0502040204020203" pitchFamily="34" charset="0"/>
+              </a:rPr>
+              <a:t>Dejvid</a:t>
+            </a:r>
+            <a:r>
+              <a:rPr lang="en-US" sz="1400" dirty="0" smtClean="0">
+                <a:solidFill>
+                  <a:schemeClr val="tx1">
+                    <a:lumMod val="75000"/>
+                    <a:lumOff val="25000"/>
+                  </a:schemeClr>
+                </a:solidFill>
+                <a:cs typeface="Segoe UI" panose="020B0502040204020203" pitchFamily="34" charset="0"/>
+              </a:rPr>
+              <a:t> Filo, </a:t>
+            </a:r>
+            <a:r>
+              <a:rPr lang="en-US" sz="1400" dirty="0" smtClean="0">
+                <a:solidFill>
+                  <a:schemeClr val="tx1">
+                    <a:lumMod val="75000"/>
+                    <a:lumOff val="25000"/>
+                  </a:schemeClr>
+                </a:solidFill>
+                <a:cs typeface="Segoe UI" panose="020B0502040204020203" pitchFamily="34" charset="0"/>
+              </a:rPr>
+              <a:t>student</a:t>
+            </a:r>
+            <a:r>
+              <a:rPr lang="sr-Latn-RS" sz="1400" dirty="0" smtClean="0">
+                <a:solidFill>
+                  <a:schemeClr val="tx1">
+                    <a:lumMod val="75000"/>
+                    <a:lumOff val="25000"/>
+                  </a:schemeClr>
+                </a:solidFill>
+                <a:cs typeface="Segoe UI" panose="020B0502040204020203" pitchFamily="34" charset="0"/>
+              </a:rPr>
+              <a:t>i</a:t>
+            </a:r>
+            <a:r>
+              <a:rPr lang="en-US" sz="1400" dirty="0" smtClean="0">
+                <a:solidFill>
+                  <a:schemeClr val="tx1">
+                    <a:lumMod val="75000"/>
+                    <a:lumOff val="25000"/>
+                  </a:schemeClr>
+                </a:solidFill>
+                <a:cs typeface="Segoe UI" panose="020B0502040204020203" pitchFamily="34" charset="0"/>
+              </a:rPr>
+              <a:t> </a:t>
+            </a:r>
+            <a:r>
+              <a:rPr lang="en-US" sz="1400" dirty="0" smtClean="0">
+                <a:solidFill>
+                  <a:schemeClr val="tx1">
+                    <a:lumMod val="75000"/>
+                    <a:lumOff val="25000"/>
+                  </a:schemeClr>
+                </a:solidFill>
+                <a:cs typeface="Segoe UI" panose="020B0502040204020203" pitchFamily="34" charset="0"/>
+              </a:rPr>
+              <a:t>Stanford </a:t>
             </a:r>
             <a:r>
               <a:rPr lang="en-US" sz="1400" dirty="0" err="1" smtClean="0">
@@ -14204,7 +14200,7 @@
         </p:blipFill>
         <p:spPr>
           <a:xfrm>
-            <a:off x="381005" y="1152304"/>
+            <a:off x="572594" y="1210405"/>
             <a:ext cx="3980506" cy="2439665"/>
           </a:xfrm>
           <a:prstGeom prst="rect">
@@ -14214,7 +14210,7 @@
       </p:pic>
       <p:pic>
         <p:nvPicPr>
-          <p:cNvPr id="20" name="Picture 19"/>
+          <p:cNvPr id="24" name="Picture 23"/>
           <p:cNvPicPr/>
           <p:nvPr/>
         </p:nvPicPr>
@@ -14226,8 +14222,8 @@
         </p:blipFill>
         <p:spPr>
           <a:xfrm>
-            <a:off x="5753100" y="1097164"/>
-            <a:ext cx="5943600" cy="2077720"/>
+            <a:off x="5855768" y="1341802"/>
+            <a:ext cx="5498027" cy="2656554"/>
           </a:xfrm>
           <a:prstGeom prst="rect">
             <a:avLst/>
@@ -14236,7 +14232,7 @@
       </p:pic>
       <p:pic>
         <p:nvPicPr>
-          <p:cNvPr id="3" name="Picture 2"/>
+          <p:cNvPr id="25" name="Picture 24"/>
           <p:cNvPicPr>
             <a:picLocks noChangeAspect="1"/>
           </p:cNvPicPr>
@@ -14256,7 +14252,7 @@
         </p:blipFill>
         <p:spPr>
           <a:xfrm>
-            <a:off x="3436065" y="2372136"/>
+            <a:off x="3036619" y="2359052"/>
             <a:ext cx="5943600" cy="1981200"/>
           </a:xfrm>
           <a:prstGeom prst="rect">
@@ -14409,14 +14405,6 @@
               </a:rPr>
               <a:t>DebugIt</a:t>
             </a:r>
-            <a:endParaRPr lang="sr-Latn-RS" sz="2800" b="1" i="1" dirty="0" smtClean="0">
-              <a:solidFill>
-                <a:schemeClr val="tx1">
-                  <a:lumMod val="75000"/>
-                  <a:lumOff val="25000"/>
-                </a:schemeClr>
-              </a:solidFill>
-            </a:endParaRPr>
           </a:p>
         </p:txBody>
       </p:sp>
@@ -14562,7 +14550,7 @@
         <p:spPr>
           <a:xfrm>
             <a:off x="228599" y="780068"/>
-            <a:ext cx="6581561" cy="3164915"/>
+            <a:ext cx="6653999" cy="3199749"/>
           </a:xfrm>
           <a:prstGeom prst="rect">
             <a:avLst/>
@@ -14583,7 +14571,7 @@
         </p:blipFill>
         <p:spPr>
           <a:xfrm>
-            <a:off x="5381839" y="3584704"/>
+            <a:off x="5268627" y="3480201"/>
             <a:ext cx="6581561" cy="3156477"/>
           </a:xfrm>
           <a:prstGeom prst="rect">
@@ -14736,14 +14724,6 @@
               </a:rPr>
               <a:t>DebugIt</a:t>
             </a:r>
-            <a:endParaRPr lang="sr-Latn-RS" sz="2800" b="1" i="1" dirty="0" smtClean="0">
-              <a:solidFill>
-                <a:schemeClr val="tx1">
-                  <a:lumMod val="75000"/>
-                  <a:lumOff val="25000"/>
-                </a:schemeClr>
-              </a:solidFill>
-            </a:endParaRPr>
           </a:p>
         </p:txBody>
       </p:sp>
@@ -14888,8 +14868,8 @@
         </p:blipFill>
         <p:spPr>
           <a:xfrm>
-            <a:off x="240490" y="780067"/>
-            <a:ext cx="6537397" cy="3138789"/>
+            <a:off x="240489" y="780068"/>
+            <a:ext cx="6647991" cy="3191888"/>
           </a:xfrm>
           <a:prstGeom prst="rect">
             <a:avLst/>
@@ -14910,8 +14890,8 @@
         </p:blipFill>
         <p:spPr>
           <a:xfrm>
-            <a:off x="5426003" y="3572517"/>
-            <a:ext cx="6537397" cy="3102470"/>
+            <a:off x="5230501" y="3471016"/>
+            <a:ext cx="6647991" cy="3154955"/>
           </a:xfrm>
           <a:prstGeom prst="rect">
             <a:avLst/>
@@ -14939,6 +14919,389 @@
 </file>
 
 <file path=ppt/slides/slide22.xml><?xml version="1.0" encoding="utf-8"?>
+<p:sld xmlns:a="http://schemas.openxmlformats.org/drawingml/2006/main" xmlns:r="http://schemas.openxmlformats.org/officeDocument/2006/relationships" xmlns:p="http://schemas.openxmlformats.org/presentationml/2006/main">
+  <p:cSld>
+    <p:spTree>
+      <p:nvGrpSpPr>
+        <p:cNvPr id="1" name=""/>
+        <p:cNvGrpSpPr/>
+        <p:nvPr/>
+      </p:nvGrpSpPr>
+      <p:grpSpPr>
+        <a:xfrm>
+          <a:off x="0" y="0"/>
+          <a:ext cx="0" cy="0"/>
+          <a:chOff x="0" y="0"/>
+          <a:chExt cx="0" cy="0"/>
+        </a:xfrm>
+      </p:grpSpPr>
+      <p:cxnSp>
+        <p:nvCxnSpPr>
+          <p:cNvPr id="8" name="Straight Connector 7">
+            <a:extLst>
+              <a:ext uri="{FF2B5EF4-FFF2-40B4-BE49-F238E27FC236}">
+                <a16:creationId xmlns:a16="http://schemas.microsoft.com/office/drawing/2014/main" id="{D0986099-F5F2-4E8B-BE17-81194861A00C}"/>
+              </a:ext>
+              <a:ext uri="{C183D7F6-B498-43B3-948B-1728B52AA6E4}">
+                <adec:decorative xmlns="" xmlns:adec="http://schemas.microsoft.com/office/drawing/2017/decorative" val="1"/>
+              </a:ext>
+            </a:extLst>
+          </p:cNvPr>
+          <p:cNvCxnSpPr>
+            <a:cxnSpLocks/>
+          </p:cNvCxnSpPr>
+          <p:nvPr/>
+        </p:nvCxnSpPr>
+        <p:spPr>
+          <a:xfrm>
+            <a:off x="8105775" y="522898"/>
+            <a:ext cx="4086225" cy="0"/>
+          </a:xfrm>
+          <a:prstGeom prst="line">
+            <a:avLst/>
+          </a:prstGeom>
+          <a:ln>
+            <a:solidFill>
+              <a:schemeClr val="accent3">
+                <a:lumMod val="50000"/>
+              </a:schemeClr>
+            </a:solidFill>
+            <a:headEnd type="oval"/>
+          </a:ln>
+        </p:spPr>
+        <p:style>
+          <a:lnRef idx="1">
+            <a:schemeClr val="accent1"/>
+          </a:lnRef>
+          <a:fillRef idx="0">
+            <a:schemeClr val="accent1"/>
+          </a:fillRef>
+          <a:effectRef idx="0">
+            <a:schemeClr val="accent1"/>
+          </a:effectRef>
+          <a:fontRef idx="minor">
+            <a:schemeClr val="tx1"/>
+          </a:fontRef>
+        </p:style>
+      </p:cxnSp>
+      <p:sp>
+        <p:nvSpPr>
+          <p:cNvPr id="11" name="Title 1">
+            <a:extLst>
+              <a:ext uri="{FF2B5EF4-FFF2-40B4-BE49-F238E27FC236}">
+                <a16:creationId xmlns:a16="http://schemas.microsoft.com/office/drawing/2014/main" id="{4E3F5479-058B-4FA8-92E9-18CAB8CDC5C5}"/>
+              </a:ext>
+            </a:extLst>
+          </p:cNvPr>
+          <p:cNvSpPr txBox="1">
+            <a:spLocks/>
+          </p:cNvSpPr>
+          <p:nvPr/>
+        </p:nvSpPr>
+        <p:spPr>
+          <a:xfrm>
+            <a:off x="228600" y="190500"/>
+            <a:ext cx="11734800" cy="387798"/>
+          </a:xfrm>
+          <a:prstGeom prst="rect">
+            <a:avLst/>
+          </a:prstGeom>
+        </p:spPr>
+        <p:txBody>
+          <a:bodyPr vert="horz" wrap="square" lIns="0" tIns="0" rIns="0" bIns="0" rtlCol="0" anchor="t">
+            <a:spAutoFit/>
+          </a:bodyPr>
+          <a:lstStyle>
+            <a:lvl1pPr algn="l" defTabSz="914400" rtl="0" eaLnBrk="1" latinLnBrk="0" hangingPunct="1">
+              <a:lnSpc>
+                <a:spcPct val="90000"/>
+              </a:lnSpc>
+              <a:spcBef>
+                <a:spcPct val="0"/>
+              </a:spcBef>
+              <a:buNone/>
+              <a:defRPr sz="4400" kern="1200">
+                <a:solidFill>
+                  <a:schemeClr val="tx1"/>
+                </a:solidFill>
+                <a:latin typeface="+mj-lt"/>
+                <a:ea typeface="+mj-ea"/>
+                <a:cs typeface="+mj-cs"/>
+              </a:defRPr>
+            </a:lvl1pPr>
+          </a:lstStyle>
+          <a:p>
+            <a:pPr algn="ctr"/>
+            <a:r>
+              <a:rPr lang="en-US" sz="2800" b="1" i="1" dirty="0" err="1" smtClean="0">
+                <a:solidFill>
+                  <a:schemeClr val="tx1">
+                    <a:lumMod val="75000"/>
+                    <a:lumOff val="25000"/>
+                  </a:schemeClr>
+                </a:solidFill>
+              </a:rPr>
+              <a:t>Zaklju</a:t>
+            </a:r>
+            <a:r>
+              <a:rPr lang="sr-Latn-RS" sz="2800" b="1" i="1" dirty="0" smtClean="0">
+                <a:solidFill>
+                  <a:schemeClr val="tx1">
+                    <a:lumMod val="75000"/>
+                    <a:lumOff val="25000"/>
+                  </a:schemeClr>
+                </a:solidFill>
+              </a:rPr>
+              <a:t>čak</a:t>
+            </a:r>
+          </a:p>
+        </p:txBody>
+      </p:sp>
+      <p:cxnSp>
+        <p:nvCxnSpPr>
+          <p:cNvPr id="14" name="Straight Connector 13">
+            <a:extLst>
+              <a:ext uri="{FF2B5EF4-FFF2-40B4-BE49-F238E27FC236}">
+                <a16:creationId xmlns:a16="http://schemas.microsoft.com/office/drawing/2014/main" id="{83E690F4-843A-47A5-8620-4FB01C0D8E68}"/>
+              </a:ext>
+              <a:ext uri="{C183D7F6-B498-43B3-948B-1728B52AA6E4}">
+                <adec:decorative xmlns="" xmlns:adec="http://schemas.microsoft.com/office/drawing/2017/decorative" val="1"/>
+              </a:ext>
+            </a:extLst>
+          </p:cNvPr>
+          <p:cNvCxnSpPr>
+            <a:cxnSpLocks/>
+          </p:cNvCxnSpPr>
+          <p:nvPr/>
+        </p:nvCxnSpPr>
+        <p:spPr>
+          <a:xfrm>
+            <a:off x="0" y="522898"/>
+            <a:ext cx="4086225" cy="0"/>
+          </a:xfrm>
+          <a:prstGeom prst="line">
+            <a:avLst/>
+          </a:prstGeom>
+          <a:ln>
+            <a:solidFill>
+              <a:schemeClr val="accent3">
+                <a:lumMod val="50000"/>
+              </a:schemeClr>
+            </a:solidFill>
+            <a:tailEnd type="oval"/>
+          </a:ln>
+        </p:spPr>
+        <p:style>
+          <a:lnRef idx="1">
+            <a:schemeClr val="accent1"/>
+          </a:lnRef>
+          <a:fillRef idx="0">
+            <a:schemeClr val="accent1"/>
+          </a:fillRef>
+          <a:effectRef idx="0">
+            <a:schemeClr val="accent1"/>
+          </a:effectRef>
+          <a:fontRef idx="minor">
+            <a:schemeClr val="tx1"/>
+          </a:fontRef>
+        </p:style>
+      </p:cxnSp>
+      <p:sp>
+        <p:nvSpPr>
+          <p:cNvPr id="33" name="Rectangle 32">
+            <a:extLst>
+              <a:ext uri="{FF2B5EF4-FFF2-40B4-BE49-F238E27FC236}">
+                <a16:creationId xmlns:a16="http://schemas.microsoft.com/office/drawing/2014/main" id="{913AB221-FD8D-4664-9B4C-AE1B1660ECAA}"/>
+              </a:ext>
+            </a:extLst>
+          </p:cNvPr>
+          <p:cNvSpPr/>
+          <p:nvPr/>
+        </p:nvSpPr>
+        <p:spPr>
+          <a:xfrm>
+            <a:off x="690379" y="1145182"/>
+            <a:ext cx="10811242" cy="1661993"/>
+          </a:xfrm>
+          <a:prstGeom prst="rect">
+            <a:avLst/>
+          </a:prstGeom>
+        </p:spPr>
+        <p:txBody>
+          <a:bodyPr wrap="square" lIns="0" tIns="0" rIns="0" bIns="0" anchor="t">
+            <a:spAutoFit/>
+          </a:bodyPr>
+          <a:lstStyle/>
+          <a:p>
+            <a:pPr marL="285750" indent="-285750">
+              <a:lnSpc>
+                <a:spcPct val="150000"/>
+              </a:lnSpc>
+              <a:buFont typeface="Arial" panose="020B0604020202020204" pitchFamily="34" charset="0"/>
+              <a:buChar char="•"/>
+            </a:pPr>
+            <a:r>
+              <a:rPr lang="sr-Latn-RS" dirty="0" smtClean="0">
+                <a:solidFill>
+                  <a:schemeClr val="tx1">
+                    <a:lumMod val="75000"/>
+                    <a:lumOff val="25000"/>
+                  </a:schemeClr>
+                </a:solidFill>
+                <a:latin typeface="Segoe UI" panose="020B0502040204020203" pitchFamily="34" charset="0"/>
+                <a:cs typeface="Segoe UI" panose="020B0502040204020203" pitchFamily="34" charset="0"/>
+              </a:rPr>
+              <a:t>Pretraga u okviru gotovo svakog sajta</a:t>
+            </a:r>
+          </a:p>
+          <a:p>
+            <a:pPr marL="285750" indent="-285750">
+              <a:lnSpc>
+                <a:spcPct val="150000"/>
+              </a:lnSpc>
+              <a:buFont typeface="Arial" panose="020B0604020202020204" pitchFamily="34" charset="0"/>
+              <a:buChar char="•"/>
+            </a:pPr>
+            <a:r>
+              <a:rPr lang="en-US" dirty="0" err="1" smtClean="0">
+                <a:solidFill>
+                  <a:schemeClr val="tx1">
+                    <a:lumMod val="75000"/>
+                    <a:lumOff val="25000"/>
+                  </a:schemeClr>
+                </a:solidFill>
+                <a:latin typeface="Segoe UI" panose="020B0502040204020203" pitchFamily="34" charset="0"/>
+                <a:cs typeface="Segoe UI" panose="020B0502040204020203" pitchFamily="34" charset="0"/>
+              </a:rPr>
+              <a:t>Istra</a:t>
+            </a:r>
+            <a:r>
+              <a:rPr lang="sr-Latn-RS" dirty="0" smtClean="0">
+                <a:solidFill>
+                  <a:schemeClr val="tx1">
+                    <a:lumMod val="75000"/>
+                    <a:lumOff val="25000"/>
+                  </a:schemeClr>
+                </a:solidFill>
+                <a:latin typeface="Segoe UI" panose="020B0502040204020203" pitchFamily="34" charset="0"/>
+                <a:cs typeface="Segoe UI" panose="020B0502040204020203" pitchFamily="34" charset="0"/>
+              </a:rPr>
+              <a:t>živanje, postavljanje pitanja i međusobno pomaganje</a:t>
+            </a:r>
+          </a:p>
+          <a:p>
+            <a:pPr marL="285750" indent="-285750">
+              <a:lnSpc>
+                <a:spcPct val="150000"/>
+              </a:lnSpc>
+              <a:buFont typeface="Arial" panose="020B0604020202020204" pitchFamily="34" charset="0"/>
+              <a:buChar char="•"/>
+            </a:pPr>
+            <a:r>
+              <a:rPr lang="sr-Latn-RS" dirty="0" smtClean="0">
+                <a:solidFill>
+                  <a:schemeClr val="tx1">
+                    <a:lumMod val="75000"/>
+                    <a:lumOff val="25000"/>
+                  </a:schemeClr>
+                </a:solidFill>
+                <a:latin typeface="Segoe UI" panose="020B0502040204020203" pitchFamily="34" charset="0"/>
+                <a:cs typeface="Segoe UI" panose="020B0502040204020203" pitchFamily="34" charset="0"/>
+              </a:rPr>
+              <a:t>Dodatne informacije</a:t>
+            </a:r>
+          </a:p>
+          <a:p>
+            <a:pPr marL="285750" indent="-285750">
+              <a:lnSpc>
+                <a:spcPct val="150000"/>
+              </a:lnSpc>
+              <a:buFont typeface="Arial" panose="020B0604020202020204" pitchFamily="34" charset="0"/>
+              <a:buChar char="•"/>
+            </a:pPr>
+            <a:r>
+              <a:rPr lang="sr-Latn-RS" dirty="0" smtClean="0">
+                <a:solidFill>
+                  <a:schemeClr val="tx1">
+                    <a:lumMod val="75000"/>
+                    <a:lumOff val="25000"/>
+                  </a:schemeClr>
+                </a:solidFill>
+                <a:latin typeface="Segoe UI" panose="020B0502040204020203" pitchFamily="34" charset="0"/>
+                <a:cs typeface="Segoe UI" panose="020B0502040204020203" pitchFamily="34" charset="0"/>
+              </a:rPr>
+              <a:t>Fakultet </a:t>
+            </a:r>
+            <a:r>
+              <a:rPr lang="sr-Latn-RS" dirty="0" smtClean="0">
+                <a:solidFill>
+                  <a:schemeClr val="tx1">
+                    <a:lumMod val="75000"/>
+                    <a:lumOff val="25000"/>
+                  </a:schemeClr>
+                </a:solidFill>
+                <a:latin typeface="Segoe UI" panose="020B0502040204020203" pitchFamily="34" charset="0"/>
+                <a:cs typeface="Segoe UI" panose="020B0502040204020203" pitchFamily="34" charset="0"/>
+              </a:rPr>
+              <a:t>kao velika zajednica</a:t>
+            </a:r>
+          </a:p>
+        </p:txBody>
+      </p:sp>
+      <p:sp>
+        <p:nvSpPr>
+          <p:cNvPr id="2" name="Title 1" hidden="1">
+            <a:extLst>
+              <a:ext uri="{FF2B5EF4-FFF2-40B4-BE49-F238E27FC236}">
+                <a16:creationId xmlns:a16="http://schemas.microsoft.com/office/drawing/2014/main" id="{09C05F0C-382F-476A-A0D2-932E111A7F9A}"/>
+              </a:ext>
+            </a:extLst>
+          </p:cNvPr>
+          <p:cNvSpPr>
+            <a:spLocks noGrp="1"/>
+          </p:cNvSpPr>
+          <p:nvPr>
+            <p:ph type="title" idx="4294967295"/>
+          </p:nvPr>
+        </p:nvSpPr>
+        <p:spPr>
+          <a:xfrm>
+            <a:off x="0" y="365125"/>
+            <a:ext cx="10515600" cy="1325563"/>
+          </a:xfrm>
+        </p:spPr>
+        <p:txBody>
+          <a:bodyPr/>
+          <a:lstStyle/>
+          <a:p>
+            <a:r>
+              <a:rPr lang="en-US" dirty="0"/>
+              <a:t>Project analysis slide 11</a:t>
+            </a:r>
+          </a:p>
+        </p:txBody>
+      </p:sp>
+    </p:spTree>
+    <p:extLst>
+      <p:ext uri="{BB962C8B-B14F-4D97-AF65-F5344CB8AC3E}">
+        <p14:creationId xmlns:p14="http://schemas.microsoft.com/office/powerpoint/2010/main" val="2863834341"/>
+      </p:ext>
+    </p:extLst>
+  </p:cSld>
+  <p:clrMapOvr>
+    <a:masterClrMapping/>
+  </p:clrMapOvr>
+  <p:timing>
+    <p:tnLst>
+      <p:par>
+        <p:cTn id="1" dur="indefinite" restart="never" nodeType="tmRoot"/>
+      </p:par>
+    </p:tnLst>
+  </p:timing>
+</p:sld>
+</file>
+
+<file path=ppt/slides/slide23.xml><?xml version="1.0" encoding="utf-8"?>
 <p:sld xmlns:a="http://schemas.openxmlformats.org/drawingml/2006/main" xmlns:r="http://schemas.openxmlformats.org/officeDocument/2006/relationships" xmlns:p="http://schemas.openxmlformats.org/presentationml/2006/main">
   <p:cSld>
     <p:bg>
@@ -15396,7 +15759,7 @@
         <p:spPr>
           <a:xfrm>
             <a:off x="690379" y="1444120"/>
-            <a:ext cx="10811242" cy="2808461"/>
+            <a:ext cx="10811242" cy="1800493"/>
           </a:xfrm>
           <a:prstGeom prst="rect">
             <a:avLst/>
@@ -15423,7 +15786,33 @@
                 <a:latin typeface="Segoe UI" panose="020B0502040204020203" pitchFamily="34" charset="0"/>
                 <a:cs typeface="Segoe UI" panose="020B0502040204020203" pitchFamily="34" charset="0"/>
               </a:rPr>
-              <a:t>Platforma </a:t>
+              <a:t>I</a:t>
+            </a:r>
+            <a:r>
+              <a:rPr lang="en-US" dirty="0" err="1" smtClean="0">
+                <a:solidFill>
+                  <a:schemeClr val="tx1">
+                    <a:lumMod val="75000"/>
+                    <a:lumOff val="25000"/>
+                  </a:schemeClr>
+                </a:solidFill>
+                <a:latin typeface="Segoe UI" panose="020B0502040204020203" pitchFamily="34" charset="0"/>
+                <a:cs typeface="Segoe UI" panose="020B0502040204020203" pitchFamily="34" charset="0"/>
+              </a:rPr>
+              <a:t>mplementaciona</a:t>
+            </a:r>
+            <a:r>
+              <a:rPr lang="en-US" dirty="0" smtClean="0">
+                <a:solidFill>
+                  <a:schemeClr val="tx1">
+                    <a:lumMod val="75000"/>
+                    <a:lumOff val="25000"/>
+                  </a:schemeClr>
+                </a:solidFill>
+                <a:latin typeface="Segoe UI" panose="020B0502040204020203" pitchFamily="34" charset="0"/>
+                <a:cs typeface="Segoe UI" panose="020B0502040204020203" pitchFamily="34" charset="0"/>
+              </a:rPr>
+              <a:t> </a:t>
             </a:r>
             <a:r>
               <a:rPr lang="en-US" dirty="0" err="1">
@@ -15436,7 +15825,7 @@
                 <a:latin typeface="Segoe UI" panose="020B0502040204020203" pitchFamily="34" charset="0"/>
                 <a:cs typeface="Segoe UI" panose="020B0502040204020203" pitchFamily="34" charset="0"/>
               </a:rPr>
-              <a:t>koja</a:t>
+              <a:t>i</a:t>
             </a:r>
             <a:r>
               <a:rPr lang="en-US" dirty="0">
@@ -15452,6 +15841,32 @@
               <a:t> </a:t>
             </a:r>
             <a:r>
+              <a:rPr lang="en-US" dirty="0" err="1">
+                <a:solidFill>
+                  <a:schemeClr val="tx1">
+                    <a:lumMod val="75000"/>
+                    <a:lumOff val="25000"/>
+                  </a:schemeClr>
+                </a:solidFill>
+                <a:latin typeface="Segoe UI" panose="020B0502040204020203" pitchFamily="34" charset="0"/>
+                <a:cs typeface="Segoe UI" panose="020B0502040204020203" pitchFamily="34" charset="0"/>
+              </a:rPr>
+              <a:t>diskusiona</a:t>
+            </a:r>
+            <a:r>
+              <a:rPr lang="en-US" dirty="0">
+                <a:solidFill>
+                  <a:schemeClr val="tx1">
+                    <a:lumMod val="75000"/>
+                    <a:lumOff val="25000"/>
+                  </a:schemeClr>
+                </a:solidFill>
+                <a:latin typeface="Segoe UI" panose="020B0502040204020203" pitchFamily="34" charset="0"/>
+                <a:cs typeface="Segoe UI" panose="020B0502040204020203" pitchFamily="34" charset="0"/>
+              </a:rPr>
+              <a:t> </a:t>
+            </a:r>
+            <a:r>
               <a:rPr lang="en-US" dirty="0" err="1" smtClean="0">
                 <a:solidFill>
                   <a:schemeClr val="tx1">
@@ -15462,7 +15877,7 @@
                 <a:latin typeface="Segoe UI" panose="020B0502040204020203" pitchFamily="34" charset="0"/>
                 <a:cs typeface="Segoe UI" panose="020B0502040204020203" pitchFamily="34" charset="0"/>
               </a:rPr>
-              <a:t>obuhvat</a:t>
+              <a:t>pitanj</a:t>
             </a:r>
             <a:r>
               <a:rPr lang="sr-Latn-RS" dirty="0" smtClean="0">
@@ -15476,279 +15891,6 @@
                 <a:cs typeface="Segoe UI" panose="020B0502040204020203" pitchFamily="34" charset="0"/>
               </a:rPr>
               <a:t>a</a:t>
-            </a:r>
-            <a:r>
-              <a:rPr lang="en-US" dirty="0" smtClean="0">
-                <a:solidFill>
-                  <a:schemeClr val="tx1">
-                    <a:lumMod val="75000"/>
-                    <a:lumOff val="25000"/>
-                  </a:schemeClr>
-                </a:solidFill>
-                <a:latin typeface="Segoe UI" panose="020B0502040204020203" pitchFamily="34" charset="0"/>
-                <a:cs typeface="Segoe UI" panose="020B0502040204020203" pitchFamily="34" charset="0"/>
-              </a:rPr>
-              <a:t> </a:t>
-            </a:r>
-            <a:r>
-              <a:rPr lang="en-US" dirty="0" err="1">
-                <a:solidFill>
-                  <a:schemeClr val="tx1">
-                    <a:lumMod val="75000"/>
-                    <a:lumOff val="25000"/>
-                  </a:schemeClr>
-                </a:solidFill>
-                <a:latin typeface="Segoe UI" panose="020B0502040204020203" pitchFamily="34" charset="0"/>
-                <a:cs typeface="Segoe UI" panose="020B0502040204020203" pitchFamily="34" charset="0"/>
-              </a:rPr>
-              <a:t>sva</a:t>
-            </a:r>
-            <a:r>
-              <a:rPr lang="en-US" dirty="0">
-                <a:solidFill>
-                  <a:schemeClr val="tx1">
-                    <a:lumMod val="75000"/>
-                    <a:lumOff val="25000"/>
-                  </a:schemeClr>
-                </a:solidFill>
-                <a:latin typeface="Segoe UI" panose="020B0502040204020203" pitchFamily="34" charset="0"/>
-                <a:cs typeface="Segoe UI" panose="020B0502040204020203" pitchFamily="34" charset="0"/>
-              </a:rPr>
-              <a:t> </a:t>
-            </a:r>
-            <a:r>
-              <a:rPr lang="en-US" dirty="0" err="1">
-                <a:solidFill>
-                  <a:schemeClr val="tx1">
-                    <a:lumMod val="75000"/>
-                    <a:lumOff val="25000"/>
-                  </a:schemeClr>
-                </a:solidFill>
-                <a:latin typeface="Segoe UI" panose="020B0502040204020203" pitchFamily="34" charset="0"/>
-                <a:cs typeface="Segoe UI" panose="020B0502040204020203" pitchFamily="34" charset="0"/>
-              </a:rPr>
-              <a:t>implementaciona</a:t>
-            </a:r>
-            <a:r>
-              <a:rPr lang="en-US" dirty="0">
-                <a:solidFill>
-                  <a:schemeClr val="tx1">
-                    <a:lumMod val="75000"/>
-                    <a:lumOff val="25000"/>
-                  </a:schemeClr>
-                </a:solidFill>
-                <a:latin typeface="Segoe UI" panose="020B0502040204020203" pitchFamily="34" charset="0"/>
-                <a:cs typeface="Segoe UI" panose="020B0502040204020203" pitchFamily="34" charset="0"/>
-              </a:rPr>
-              <a:t> </a:t>
-            </a:r>
-            <a:r>
-              <a:rPr lang="en-US" dirty="0" err="1">
-                <a:solidFill>
-                  <a:schemeClr val="tx1">
-                    <a:lumMod val="75000"/>
-                    <a:lumOff val="25000"/>
-                  </a:schemeClr>
-                </a:solidFill>
-                <a:latin typeface="Segoe UI" panose="020B0502040204020203" pitchFamily="34" charset="0"/>
-                <a:cs typeface="Segoe UI" panose="020B0502040204020203" pitchFamily="34" charset="0"/>
-              </a:rPr>
-              <a:t>i</a:t>
-            </a:r>
-            <a:r>
-              <a:rPr lang="en-US" dirty="0">
-                <a:solidFill>
-                  <a:schemeClr val="tx1">
-                    <a:lumMod val="75000"/>
-                    <a:lumOff val="25000"/>
-                  </a:schemeClr>
-                </a:solidFill>
-                <a:latin typeface="Segoe UI" panose="020B0502040204020203" pitchFamily="34" charset="0"/>
-                <a:cs typeface="Segoe UI" panose="020B0502040204020203" pitchFamily="34" charset="0"/>
-              </a:rPr>
-              <a:t> </a:t>
-            </a:r>
-            <a:r>
-              <a:rPr lang="en-US" dirty="0" err="1">
-                <a:solidFill>
-                  <a:schemeClr val="tx1">
-                    <a:lumMod val="75000"/>
-                    <a:lumOff val="25000"/>
-                  </a:schemeClr>
-                </a:solidFill>
-                <a:latin typeface="Segoe UI" panose="020B0502040204020203" pitchFamily="34" charset="0"/>
-                <a:cs typeface="Segoe UI" panose="020B0502040204020203" pitchFamily="34" charset="0"/>
-              </a:rPr>
-              <a:t>diskusiona</a:t>
-            </a:r>
-            <a:r>
-              <a:rPr lang="en-US" dirty="0">
-                <a:solidFill>
-                  <a:schemeClr val="tx1">
-                    <a:lumMod val="75000"/>
-                    <a:lumOff val="25000"/>
-                  </a:schemeClr>
-                </a:solidFill>
-                <a:latin typeface="Segoe UI" panose="020B0502040204020203" pitchFamily="34" charset="0"/>
-                <a:cs typeface="Segoe UI" panose="020B0502040204020203" pitchFamily="34" charset="0"/>
-              </a:rPr>
-              <a:t> </a:t>
-            </a:r>
-            <a:r>
-              <a:rPr lang="en-US" dirty="0" err="1">
-                <a:solidFill>
-                  <a:schemeClr val="tx1">
-                    <a:lumMod val="75000"/>
-                    <a:lumOff val="25000"/>
-                  </a:schemeClr>
-                </a:solidFill>
-                <a:latin typeface="Segoe UI" panose="020B0502040204020203" pitchFamily="34" charset="0"/>
-                <a:cs typeface="Segoe UI" panose="020B0502040204020203" pitchFamily="34" charset="0"/>
-              </a:rPr>
-              <a:t>pitanja</a:t>
-            </a:r>
-            <a:r>
-              <a:rPr lang="en-US" dirty="0">
-                <a:solidFill>
-                  <a:schemeClr val="tx1">
-                    <a:lumMod val="75000"/>
-                    <a:lumOff val="25000"/>
-                  </a:schemeClr>
-                </a:solidFill>
-                <a:latin typeface="Segoe UI" panose="020B0502040204020203" pitchFamily="34" charset="0"/>
-                <a:cs typeface="Segoe UI" panose="020B0502040204020203" pitchFamily="34" charset="0"/>
-              </a:rPr>
-              <a:t> </a:t>
-            </a:r>
-            <a:r>
-              <a:rPr lang="en-US" dirty="0" err="1">
-                <a:solidFill>
-                  <a:schemeClr val="tx1">
-                    <a:lumMod val="75000"/>
-                    <a:lumOff val="25000"/>
-                  </a:schemeClr>
-                </a:solidFill>
-                <a:latin typeface="Segoe UI" panose="020B0502040204020203" pitchFamily="34" charset="0"/>
-                <a:cs typeface="Segoe UI" panose="020B0502040204020203" pitchFamily="34" charset="0"/>
-              </a:rPr>
-              <a:t>studenata</a:t>
-            </a:r>
-            <a:r>
-              <a:rPr lang="en-US" dirty="0">
-                <a:solidFill>
-                  <a:schemeClr val="tx1">
-                    <a:lumMod val="75000"/>
-                    <a:lumOff val="25000"/>
-                  </a:schemeClr>
-                </a:solidFill>
-                <a:latin typeface="Segoe UI" panose="020B0502040204020203" pitchFamily="34" charset="0"/>
-                <a:cs typeface="Segoe UI" panose="020B0502040204020203" pitchFamily="34" charset="0"/>
-              </a:rPr>
-              <a:t>, </a:t>
-            </a:r>
-            <a:r>
-              <a:rPr lang="en-US" dirty="0" err="1">
-                <a:solidFill>
-                  <a:schemeClr val="tx1">
-                    <a:lumMod val="75000"/>
-                    <a:lumOff val="25000"/>
-                  </a:schemeClr>
-                </a:solidFill>
-                <a:latin typeface="Segoe UI" panose="020B0502040204020203" pitchFamily="34" charset="0"/>
-                <a:cs typeface="Segoe UI" panose="020B0502040204020203" pitchFamily="34" charset="0"/>
-              </a:rPr>
-              <a:t>nezavisno</a:t>
-            </a:r>
-            <a:r>
-              <a:rPr lang="en-US" dirty="0">
-                <a:solidFill>
-                  <a:schemeClr val="tx1">
-                    <a:lumMod val="75000"/>
-                    <a:lumOff val="25000"/>
-                  </a:schemeClr>
-                </a:solidFill>
-                <a:latin typeface="Segoe UI" panose="020B0502040204020203" pitchFamily="34" charset="0"/>
-                <a:cs typeface="Segoe UI" panose="020B0502040204020203" pitchFamily="34" charset="0"/>
-              </a:rPr>
-              <a:t> od </a:t>
-            </a:r>
-            <a:r>
-              <a:rPr lang="en-US" dirty="0" err="1">
-                <a:solidFill>
-                  <a:schemeClr val="tx1">
-                    <a:lumMod val="75000"/>
-                    <a:lumOff val="25000"/>
-                  </a:schemeClr>
-                </a:solidFill>
-                <a:latin typeface="Segoe UI" panose="020B0502040204020203" pitchFamily="34" charset="0"/>
-                <a:cs typeface="Segoe UI" panose="020B0502040204020203" pitchFamily="34" charset="0"/>
-              </a:rPr>
-              <a:t>predmeta</a:t>
-            </a:r>
-            <a:r>
-              <a:rPr lang="en-US" dirty="0">
-                <a:solidFill>
-                  <a:schemeClr val="tx1">
-                    <a:lumMod val="75000"/>
-                    <a:lumOff val="25000"/>
-                  </a:schemeClr>
-                </a:solidFill>
-                <a:latin typeface="Segoe UI" panose="020B0502040204020203" pitchFamily="34" charset="0"/>
-                <a:cs typeface="Segoe UI" panose="020B0502040204020203" pitchFamily="34" charset="0"/>
-              </a:rPr>
-              <a:t> </a:t>
-            </a:r>
-            <a:r>
-              <a:rPr lang="en-US" dirty="0" err="1">
-                <a:solidFill>
-                  <a:schemeClr val="tx1">
-                    <a:lumMod val="75000"/>
-                    <a:lumOff val="25000"/>
-                  </a:schemeClr>
-                </a:solidFill>
-                <a:latin typeface="Segoe UI" panose="020B0502040204020203" pitchFamily="34" charset="0"/>
-                <a:cs typeface="Segoe UI" panose="020B0502040204020203" pitchFamily="34" charset="0"/>
-              </a:rPr>
-              <a:t>i</a:t>
-            </a:r>
-            <a:r>
-              <a:rPr lang="en-US" dirty="0">
-                <a:solidFill>
-                  <a:schemeClr val="tx1">
-                    <a:lumMod val="75000"/>
-                    <a:lumOff val="25000"/>
-                  </a:schemeClr>
-                </a:solidFill>
-                <a:latin typeface="Segoe UI" panose="020B0502040204020203" pitchFamily="34" charset="0"/>
-                <a:cs typeface="Segoe UI" panose="020B0502040204020203" pitchFamily="34" charset="0"/>
-              </a:rPr>
-              <a:t> </a:t>
-            </a:r>
-            <a:r>
-              <a:rPr lang="en-US" dirty="0" err="1">
-                <a:solidFill>
-                  <a:schemeClr val="tx1">
-                    <a:lumMod val="75000"/>
-                    <a:lumOff val="25000"/>
-                  </a:schemeClr>
-                </a:solidFill>
-                <a:latin typeface="Segoe UI" panose="020B0502040204020203" pitchFamily="34" charset="0"/>
-                <a:cs typeface="Segoe UI" panose="020B0502040204020203" pitchFamily="34" charset="0"/>
-              </a:rPr>
-              <a:t>tehnologija</a:t>
-            </a:r>
-            <a:r>
-              <a:rPr lang="en-US" dirty="0" smtClean="0">
-                <a:solidFill>
-                  <a:schemeClr val="tx1">
-                    <a:lumMod val="75000"/>
-                    <a:lumOff val="25000"/>
-                  </a:schemeClr>
-                </a:solidFill>
-                <a:latin typeface="Segoe UI" panose="020B0502040204020203" pitchFamily="34" charset="0"/>
-                <a:cs typeface="Segoe UI" panose="020B0502040204020203" pitchFamily="34" charset="0"/>
-              </a:rPr>
-              <a:t>.</a:t>
             </a:r>
             <a:endParaRPr lang="sr-Latn-RS" dirty="0" smtClean="0">
               <a:solidFill>
@@ -15838,20 +15980,7 @@
                 <a:latin typeface="Segoe UI" panose="020B0502040204020203" pitchFamily="34" charset="0"/>
                 <a:cs typeface="Segoe UI" panose="020B0502040204020203" pitchFamily="34" charset="0"/>
               </a:rPr>
-              <a:t>itanja </a:t>
-            </a:r>
-            <a:r>
-              <a:rPr lang="sr-Latn-RS" dirty="0" smtClean="0">
-                <a:solidFill>
-                  <a:schemeClr val="tx1">
-                    <a:lumMod val="75000"/>
-                    <a:lumOff val="25000"/>
-                  </a:schemeClr>
-                </a:solidFill>
-                <a:latin typeface="Segoe UI" panose="020B0502040204020203" pitchFamily="34" charset="0"/>
-                <a:cs typeface="Segoe UI" panose="020B0502040204020203" pitchFamily="34" charset="0"/>
-              </a:rPr>
-              <a:t>su uvek dostupna </a:t>
+              <a:t>itanja su uvek dostupna </a:t>
             </a:r>
             <a:r>
               <a:rPr lang="sr-Latn-RS" dirty="0" smtClean="0">
@@ -15895,6 +16024,51 @@
               </a:rPr>
               <a:t>velika zajednica</a:t>
             </a:r>
+          </a:p>
+          <a:p>
+            <a:pPr marL="800100" lvl="1" indent="-342900">
+              <a:buFont typeface="+mj-lt"/>
+              <a:buAutoNum type="arabicPeriod"/>
+            </a:pPr>
+            <a:r>
+              <a:rPr lang="en-US" dirty="0" smtClean="0">
+                <a:solidFill>
+                  <a:schemeClr val="tx1">
+                    <a:lumMod val="75000"/>
+                    <a:lumOff val="25000"/>
+                  </a:schemeClr>
+                </a:solidFill>
+                <a:latin typeface="Segoe UI" panose="020B0502040204020203" pitchFamily="34" charset="0"/>
+                <a:cs typeface="Segoe UI" panose="020B0502040204020203" pitchFamily="34" charset="0"/>
+              </a:rPr>
+              <a:t>n</a:t>
+            </a:r>
+            <a:r>
+              <a:rPr lang="sr-Latn-RS" dirty="0" smtClean="0">
+                <a:solidFill>
+                  <a:schemeClr val="tx1">
+                    <a:lumMod val="75000"/>
+                    <a:lumOff val="25000"/>
+                  </a:schemeClr>
+                </a:solidFill>
+                <a:latin typeface="Segoe UI" panose="020B0502040204020203" pitchFamily="34" charset="0"/>
+                <a:cs typeface="Segoe UI" panose="020B0502040204020203" pitchFamily="34" charset="0"/>
+              </a:rPr>
+              <a:t>ajčešći </a:t>
+            </a:r>
+            <a:r>
+              <a:rPr lang="sr-Latn-RS" dirty="0" smtClean="0">
+                <a:solidFill>
+                  <a:schemeClr val="tx1">
+                    <a:lumMod val="75000"/>
+                    <a:lumOff val="25000"/>
+                  </a:schemeClr>
+                </a:solidFill>
+                <a:latin typeface="Segoe UI" panose="020B0502040204020203" pitchFamily="34" charset="0"/>
+                <a:cs typeface="Segoe UI" panose="020B0502040204020203" pitchFamily="34" charset="0"/>
+              </a:rPr>
+              <a:t>problemi vrlo brzo dobijaju rešenje</a:t>
+            </a:r>
             <a:endParaRPr lang="sr-Latn-RS" dirty="0" smtClean="0">
               <a:solidFill>
                 <a:schemeClr val="tx1">
@@ -15922,7 +16096,7 @@
                 <a:latin typeface="Segoe UI" panose="020B0502040204020203" pitchFamily="34" charset="0"/>
                 <a:cs typeface="Segoe UI" panose="020B0502040204020203" pitchFamily="34" charset="0"/>
               </a:rPr>
-              <a:t>n</a:t>
+              <a:t>p</a:t>
             </a:r>
             <a:r>
               <a:rPr lang="sr-Latn-RS" dirty="0" smtClean="0">
@@ -15935,7 +16109,7 @@
                 <a:latin typeface="Segoe UI" panose="020B0502040204020203" pitchFamily="34" charset="0"/>
                 <a:cs typeface="Segoe UI" panose="020B0502040204020203" pitchFamily="34" charset="0"/>
               </a:rPr>
-              <a:t>ajčešći </a:t>
+              <a:t>rilagođavanje </a:t>
             </a:r>
             <a:r>
               <a:rPr lang="sr-Latn-RS" dirty="0" smtClean="0">
@@ -15948,93 +16122,16 @@
                 <a:latin typeface="Segoe UI" panose="020B0502040204020203" pitchFamily="34" charset="0"/>
                 <a:cs typeface="Segoe UI" panose="020B0502040204020203" pitchFamily="34" charset="0"/>
               </a:rPr>
-              <a:t>problemi imaju rešenje</a:t>
-            </a:r>
-          </a:p>
-          <a:p>
-            <a:pPr marL="800100" lvl="1" indent="-342900">
-              <a:buFont typeface="+mj-lt"/>
-              <a:buAutoNum type="arabicPeriod"/>
-            </a:pPr>
-            <a:r>
-              <a:rPr lang="en-US" dirty="0" smtClean="0">
-                <a:solidFill>
-                  <a:schemeClr val="tx1">
-                    <a:lumMod val="75000"/>
-                    <a:lumOff val="25000"/>
-                  </a:schemeClr>
-                </a:solidFill>
-                <a:latin typeface="Segoe UI" panose="020B0502040204020203" pitchFamily="34" charset="0"/>
-                <a:cs typeface="Segoe UI" panose="020B0502040204020203" pitchFamily="34" charset="0"/>
-              </a:rPr>
-              <a:t>p</a:t>
-            </a:r>
-            <a:r>
-              <a:rPr lang="sr-Latn-RS" dirty="0" smtClean="0">
-                <a:solidFill>
-                  <a:schemeClr val="tx1">
-                    <a:lumMod val="75000"/>
-                    <a:lumOff val="25000"/>
-                  </a:schemeClr>
-                </a:solidFill>
-                <a:latin typeface="Segoe UI" panose="020B0502040204020203" pitchFamily="34" charset="0"/>
-                <a:cs typeface="Segoe UI" panose="020B0502040204020203" pitchFamily="34" charset="0"/>
-              </a:rPr>
-              <a:t>rilagođavanje </a:t>
-            </a:r>
-            <a:r>
-              <a:rPr lang="sr-Latn-RS" dirty="0" smtClean="0">
-                <a:solidFill>
-                  <a:schemeClr val="tx1">
-                    <a:lumMod val="75000"/>
-                    <a:lumOff val="25000"/>
-                  </a:schemeClr>
-                </a:solidFill>
-                <a:latin typeface="Segoe UI" panose="020B0502040204020203" pitchFamily="34" charset="0"/>
-                <a:cs typeface="Segoe UI" panose="020B0502040204020203" pitchFamily="34" charset="0"/>
-              </a:rPr>
               <a:t>koda</a:t>
             </a:r>
-          </a:p>
-          <a:p>
-            <a:pPr marL="342900" indent="-342900">
-              <a:lnSpc>
-                <a:spcPts val="1900"/>
-              </a:lnSpc>
-              <a:buFont typeface="+mj-lt"/>
-              <a:buAutoNum type="arabicPeriod"/>
-            </a:pPr>
-            <a:endParaRPr lang="sr-Latn-RS" dirty="0" smtClean="0"/>
-          </a:p>
-          <a:p>
-            <a:pPr>
-              <a:lnSpc>
-                <a:spcPts val="1900"/>
-              </a:lnSpc>
-            </a:pPr>
-            <a:endParaRPr lang="en-US" i="1" dirty="0">
+            <a:endParaRPr lang="sr-Latn-RS" dirty="0" smtClean="0">
               <a:solidFill>
                 <a:schemeClr val="tx1">
                   <a:lumMod val="75000"/>
                   <a:lumOff val="25000"/>
                 </a:schemeClr>
               </a:solidFill>
-              <a:cs typeface="Segoe UI" panose="020B0502040204020203" pitchFamily="34" charset="0"/>
-            </a:endParaRPr>
-          </a:p>
-          <a:p>
-            <a:pPr>
-              <a:lnSpc>
-                <a:spcPts val="1900"/>
-              </a:lnSpc>
-            </a:pPr>
-            <a:endParaRPr lang="en-US" i="1" dirty="0">
-              <a:solidFill>
-                <a:schemeClr val="tx1">
-                  <a:lumMod val="75000"/>
-                  <a:lumOff val="25000"/>
-                </a:schemeClr>
-              </a:solidFill>
+              <a:latin typeface="Segoe UI" panose="020B0502040204020203" pitchFamily="34" charset="0"/>
               <a:cs typeface="Segoe UI" panose="020B0502040204020203" pitchFamily="34" charset="0"/>
             </a:endParaRPr>
           </a:p>
@@ -17790,110 +17887,6 @@
               </a:rPr>
               <a:t>mehanizam</a:t>
             </a:r>
-            <a:r>
-              <a:rPr lang="en-US" dirty="0" smtClean="0">
-                <a:solidFill>
-                  <a:schemeClr val="tx1">
-                    <a:lumMod val="75000"/>
-                    <a:lumOff val="25000"/>
-                  </a:schemeClr>
-                </a:solidFill>
-                <a:latin typeface="Segoe UI" panose="020B0502040204020203" pitchFamily="34" charset="0"/>
-                <a:cs typeface="Segoe UI" panose="020B0502040204020203" pitchFamily="34" charset="0"/>
-              </a:rPr>
-              <a:t> </a:t>
-            </a:r>
-            <a:r>
-              <a:rPr lang="en-US" dirty="0" err="1" smtClean="0">
-                <a:solidFill>
-                  <a:schemeClr val="tx1">
-                    <a:lumMod val="75000"/>
-                    <a:lumOff val="25000"/>
-                  </a:schemeClr>
-                </a:solidFill>
-                <a:latin typeface="Segoe UI" panose="020B0502040204020203" pitchFamily="34" charset="0"/>
-                <a:cs typeface="Segoe UI" panose="020B0502040204020203" pitchFamily="34" charset="0"/>
-              </a:rPr>
-              <a:t>za</a:t>
-            </a:r>
-            <a:r>
-              <a:rPr lang="en-US" dirty="0" smtClean="0">
-                <a:solidFill>
-                  <a:schemeClr val="tx1">
-                    <a:lumMod val="75000"/>
-                    <a:lumOff val="25000"/>
-                  </a:schemeClr>
-                </a:solidFill>
-                <a:latin typeface="Segoe UI" panose="020B0502040204020203" pitchFamily="34" charset="0"/>
-                <a:cs typeface="Segoe UI" panose="020B0502040204020203" pitchFamily="34" charset="0"/>
-              </a:rPr>
-              <a:t> </a:t>
-            </a:r>
-            <a:r>
-              <a:rPr lang="en-US" dirty="0" err="1" smtClean="0">
-                <a:solidFill>
-                  <a:schemeClr val="tx1">
-                    <a:lumMod val="75000"/>
-                    <a:lumOff val="25000"/>
-                  </a:schemeClr>
-                </a:solidFill>
-                <a:latin typeface="Segoe UI" panose="020B0502040204020203" pitchFamily="34" charset="0"/>
-                <a:cs typeface="Segoe UI" panose="020B0502040204020203" pitchFamily="34" charset="0"/>
-              </a:rPr>
-              <a:t>pretragu</a:t>
-            </a:r>
-            <a:r>
-              <a:rPr lang="en-US" dirty="0" smtClean="0">
-                <a:solidFill>
-                  <a:schemeClr val="tx1">
-                    <a:lumMod val="75000"/>
-                    <a:lumOff val="25000"/>
-                  </a:schemeClr>
-                </a:solidFill>
-                <a:latin typeface="Segoe UI" panose="020B0502040204020203" pitchFamily="34" charset="0"/>
-                <a:cs typeface="Segoe UI" panose="020B0502040204020203" pitchFamily="34" charset="0"/>
-              </a:rPr>
-              <a:t> </a:t>
-            </a:r>
-            <a:r>
-              <a:rPr lang="en-US" dirty="0" err="1" smtClean="0">
-                <a:solidFill>
-                  <a:schemeClr val="tx1">
-                    <a:lumMod val="75000"/>
-                    <a:lumOff val="25000"/>
-                  </a:schemeClr>
-                </a:solidFill>
-                <a:latin typeface="Segoe UI" panose="020B0502040204020203" pitchFamily="34" charset="0"/>
-                <a:cs typeface="Segoe UI" panose="020B0502040204020203" pitchFamily="34" charset="0"/>
-              </a:rPr>
-              <a:t>i</a:t>
-            </a:r>
-            <a:r>
-              <a:rPr lang="en-US" dirty="0" smtClean="0">
-                <a:solidFill>
-                  <a:schemeClr val="tx1">
-                    <a:lumMod val="75000"/>
-                    <a:lumOff val="25000"/>
-                  </a:schemeClr>
-                </a:solidFill>
-                <a:latin typeface="Segoe UI" panose="020B0502040204020203" pitchFamily="34" charset="0"/>
-                <a:cs typeface="Segoe UI" panose="020B0502040204020203" pitchFamily="34" charset="0"/>
-              </a:rPr>
-              <a:t> </a:t>
-            </a:r>
-            <a:r>
-              <a:rPr lang="en-US" dirty="0" err="1" smtClean="0">
-                <a:solidFill>
-                  <a:schemeClr val="tx1">
-                    <a:lumMod val="75000"/>
-                    <a:lumOff val="25000"/>
-                  </a:schemeClr>
-                </a:solidFill>
-                <a:latin typeface="Segoe UI" panose="020B0502040204020203" pitchFamily="34" charset="0"/>
-                <a:cs typeface="Segoe UI" panose="020B0502040204020203" pitchFamily="34" charset="0"/>
-              </a:rPr>
-              <a:t>analitiku</a:t>
-            </a:r>
             <a:endParaRPr lang="en-US" dirty="0" smtClean="0">
               <a:solidFill>
                 <a:schemeClr val="tx1">
@@ -17924,7 +17917,33 @@
                 <a:latin typeface="Segoe UI" panose="020B0502040204020203" pitchFamily="34" charset="0"/>
                 <a:cs typeface="Segoe UI" panose="020B0502040204020203" pitchFamily="34" charset="0"/>
               </a:rPr>
-              <a:t>Apache Lucene </a:t>
+              <a:t>Apache </a:t>
+            </a:r>
+            <a:r>
+              <a:rPr lang="en-US" dirty="0" err="1" smtClean="0">
+                <a:solidFill>
+                  <a:schemeClr val="tx1">
+                    <a:lumMod val="75000"/>
+                    <a:lumOff val="25000"/>
+                  </a:schemeClr>
+                </a:solidFill>
+                <a:latin typeface="Segoe UI" panose="020B0502040204020203" pitchFamily="34" charset="0"/>
+                <a:cs typeface="Segoe UI" panose="020B0502040204020203" pitchFamily="34" charset="0"/>
+              </a:rPr>
+              <a:t>Lucene</a:t>
+            </a:r>
+            <a:r>
+              <a:rPr lang="en-US" dirty="0" smtClean="0">
+                <a:solidFill>
+                  <a:schemeClr val="tx1">
+                    <a:lumMod val="75000"/>
+                    <a:lumOff val="25000"/>
+                  </a:schemeClr>
+                </a:solidFill>
+                <a:latin typeface="Segoe UI" panose="020B0502040204020203" pitchFamily="34" charset="0"/>
+                <a:cs typeface="Segoe UI" panose="020B0502040204020203" pitchFamily="34" charset="0"/>
+              </a:rPr>
+              <a:t> </a:t>
             </a:r>
             <a:r>
               <a:rPr lang="en-US" dirty="0" err="1" smtClean="0">
@@ -17959,6 +17978,19 @@
               <a:buChar char="•"/>
             </a:pPr>
             <a:r>
+              <a:rPr lang="sr-Latn-RS" dirty="0" smtClean="0">
+                <a:solidFill>
+                  <a:schemeClr val="tx1">
+                    <a:lumMod val="75000"/>
+                    <a:lumOff val="25000"/>
+                  </a:schemeClr>
+                </a:solidFill>
+                <a:latin typeface="Segoe UI" panose="020B0502040204020203" pitchFamily="34" charset="0"/>
+                <a:cs typeface="Segoe UI" panose="020B0502040204020203" pitchFamily="34" charset="0"/>
+              </a:rPr>
+              <a:t>Šej</a:t>
+            </a:r>
+            <a:r>
               <a:rPr lang="en-US" dirty="0" smtClean="0">
                 <a:solidFill>
                   <a:schemeClr val="tx1">
@@ -17969,10 +18001,10 @@
                 <a:latin typeface="Segoe UI" panose="020B0502040204020203" pitchFamily="34" charset="0"/>
                 <a:cs typeface="Segoe UI" panose="020B0502040204020203" pitchFamily="34" charset="0"/>
               </a:rPr>
-              <a:t>Shay </a:t>
-            </a:r>
-            <a:r>
-              <a:rPr lang="en-US" dirty="0" err="1" smtClean="0">
+              <a:t> B</a:t>
+            </a:r>
+            <a:r>
+              <a:rPr lang="sr-Latn-RS" dirty="0" smtClean="0">
                 <a:solidFill>
                   <a:schemeClr val="tx1">
                     <a:lumMod val="75000"/>
@@ -17982,7 +18014,20 @@
                 <a:latin typeface="Segoe UI" panose="020B0502040204020203" pitchFamily="34" charset="0"/>
                 <a:cs typeface="Segoe UI" panose="020B0502040204020203" pitchFamily="34" charset="0"/>
               </a:rPr>
-              <a:t>Banon</a:t>
+              <a:t>e</a:t>
+            </a:r>
+            <a:r>
+              <a:rPr lang="en-US" dirty="0" smtClean="0">
+                <a:solidFill>
+                  <a:schemeClr val="tx1">
+                    <a:lumMod val="75000"/>
+                    <a:lumOff val="25000"/>
+                  </a:schemeClr>
+                </a:solidFill>
+                <a:latin typeface="Segoe UI" panose="020B0502040204020203" pitchFamily="34" charset="0"/>
+                <a:cs typeface="Segoe UI" panose="020B0502040204020203" pitchFamily="34" charset="0"/>
+              </a:rPr>
+              <a:t>non</a:t>
             </a:r>
             <a:endParaRPr lang="en-US" dirty="0" smtClean="0">
               <a:solidFill>
@@ -19264,7 +19309,7 @@
         </p:blipFill>
         <p:spPr>
           <a:xfrm>
-            <a:off x="5594515" y="3146747"/>
+            <a:off x="5560802" y="3146747"/>
             <a:ext cx="1002970" cy="1116956"/>
           </a:xfrm>
           <a:prstGeom prst="rect">
@@ -19787,20 +19832,7 @@
                 <a:latin typeface="Segoe UI" panose="020B0502040204020203" pitchFamily="34" charset="0"/>
                 <a:cs typeface="Segoe UI" panose="020B0502040204020203" pitchFamily="34" charset="0"/>
               </a:rPr>
-              <a:t>forward </a:t>
-            </a:r>
-            <a:r>
-              <a:rPr lang="sr-Latn-RS" i="1" dirty="0" smtClean="0">
-                <a:solidFill>
-                  <a:schemeClr val="tx1">
-                    <a:lumMod val="75000"/>
-                    <a:lumOff val="25000"/>
-                  </a:schemeClr>
-                </a:solidFill>
-                <a:latin typeface="Segoe UI" panose="020B0502040204020203" pitchFamily="34" charset="0"/>
-                <a:cs typeface="Segoe UI" panose="020B0502040204020203" pitchFamily="34" charset="0"/>
-              </a:rPr>
-              <a:t>index</a:t>
+              <a:t>forward index</a:t>
             </a:r>
             <a:endParaRPr lang="sr-Latn-RS" dirty="0" smtClean="0">
               <a:solidFill>
@@ -19832,20 +19864,7 @@
                 <a:latin typeface="Segoe UI" panose="020B0502040204020203" pitchFamily="34" charset="0"/>
                 <a:cs typeface="Segoe UI" panose="020B0502040204020203" pitchFamily="34" charset="0"/>
               </a:rPr>
-              <a:t>inverted </a:t>
-            </a:r>
-            <a:r>
-              <a:rPr lang="sr-Latn-RS" i="1" dirty="0" smtClean="0">
-                <a:solidFill>
-                  <a:schemeClr val="tx1">
-                    <a:lumMod val="75000"/>
-                    <a:lumOff val="25000"/>
-                  </a:schemeClr>
-                </a:solidFill>
-                <a:latin typeface="Segoe UI" panose="020B0502040204020203" pitchFamily="34" charset="0"/>
-                <a:cs typeface="Segoe UI" panose="020B0502040204020203" pitchFamily="34" charset="0"/>
-              </a:rPr>
-              <a:t>index</a:t>
+              <a:t>inverted index</a:t>
             </a:r>
             <a:endParaRPr lang="en-US" dirty="0" smtClean="0">
               <a:solidFill>
@@ -20017,6 +20036,120 @@
           </a:prstGeom>
         </p:spPr>
       </p:pic>
+      <p:sp>
+        <p:nvSpPr>
+          <p:cNvPr id="10" name="Rectangle 9">
+            <a:extLst>
+              <a:ext uri="{FF2B5EF4-FFF2-40B4-BE49-F238E27FC236}">
+                <a16:creationId xmlns:a16="http://schemas.microsoft.com/office/drawing/2014/main" id="{913AB221-FD8D-4664-9B4C-AE1B1660ECAA}"/>
+              </a:ext>
+            </a:extLst>
+          </p:cNvPr>
+          <p:cNvSpPr/>
+          <p:nvPr/>
+        </p:nvSpPr>
+        <p:spPr>
+          <a:xfrm>
+            <a:off x="2461593" y="6068368"/>
+            <a:ext cx="1563672" cy="283026"/>
+          </a:xfrm>
+          <a:prstGeom prst="rect">
+            <a:avLst/>
+          </a:prstGeom>
+        </p:spPr>
+        <p:txBody>
+          <a:bodyPr wrap="square" lIns="0" tIns="0" rIns="0" bIns="0" anchor="t">
+            <a:spAutoFit/>
+          </a:bodyPr>
+          <a:lstStyle/>
+          <a:p>
+            <a:pPr>
+              <a:lnSpc>
+                <a:spcPct val="150000"/>
+              </a:lnSpc>
+            </a:pPr>
+            <a:r>
+              <a:rPr lang="sr-Latn-RS" sz="1400" i="1" dirty="0" smtClean="0">
+                <a:solidFill>
+                  <a:schemeClr val="tx1">
+                    <a:lumMod val="75000"/>
+                    <a:lumOff val="25000"/>
+                  </a:schemeClr>
+                </a:solidFill>
+                <a:latin typeface="Segoe UI" panose="020B0502040204020203" pitchFamily="34" charset="0"/>
+                <a:cs typeface="Segoe UI" panose="020B0502040204020203" pitchFamily="34" charset="0"/>
+              </a:rPr>
+              <a:t>forward index</a:t>
+            </a:r>
+            <a:endParaRPr lang="en-US" sz="1400" i="1" dirty="0" smtClean="0">
+              <a:solidFill>
+                <a:schemeClr val="tx1">
+                  <a:lumMod val="75000"/>
+                  <a:lumOff val="25000"/>
+                </a:schemeClr>
+              </a:solidFill>
+              <a:cs typeface="Segoe UI" panose="020B0502040204020203" pitchFamily="34" charset="0"/>
+            </a:endParaRPr>
+          </a:p>
+        </p:txBody>
+      </p:sp>
+      <p:sp>
+        <p:nvSpPr>
+          <p:cNvPr id="12" name="Rectangle 11">
+            <a:extLst>
+              <a:ext uri="{FF2B5EF4-FFF2-40B4-BE49-F238E27FC236}">
+                <a16:creationId xmlns:a16="http://schemas.microsoft.com/office/drawing/2014/main" id="{913AB221-FD8D-4664-9B4C-AE1B1660ECAA}"/>
+              </a:ext>
+            </a:extLst>
+          </p:cNvPr>
+          <p:cNvSpPr/>
+          <p:nvPr/>
+        </p:nvSpPr>
+        <p:spPr>
+          <a:xfrm>
+            <a:off x="7706181" y="6068368"/>
+            <a:ext cx="1563672" cy="283026"/>
+          </a:xfrm>
+          <a:prstGeom prst="rect">
+            <a:avLst/>
+          </a:prstGeom>
+        </p:spPr>
+        <p:txBody>
+          <a:bodyPr wrap="square" lIns="0" tIns="0" rIns="0" bIns="0" anchor="t">
+            <a:spAutoFit/>
+          </a:bodyPr>
+          <a:lstStyle/>
+          <a:p>
+            <a:pPr>
+              <a:lnSpc>
+                <a:spcPct val="150000"/>
+              </a:lnSpc>
+            </a:pPr>
+            <a:r>
+              <a:rPr lang="sr-Latn-RS" sz="1400" i="1" dirty="0" smtClean="0">
+                <a:solidFill>
+                  <a:schemeClr val="tx1">
+                    <a:lumMod val="75000"/>
+                    <a:lumOff val="25000"/>
+                  </a:schemeClr>
+                </a:solidFill>
+                <a:latin typeface="Segoe UI" panose="020B0502040204020203" pitchFamily="34" charset="0"/>
+                <a:cs typeface="Segoe UI" panose="020B0502040204020203" pitchFamily="34" charset="0"/>
+              </a:rPr>
+              <a:t>inverted index</a:t>
+            </a:r>
+            <a:endParaRPr lang="en-US" sz="1400" i="1" dirty="0" smtClean="0">
+              <a:solidFill>
+                <a:schemeClr val="tx1">
+                  <a:lumMod val="75000"/>
+                  <a:lumOff val="25000"/>
+                </a:schemeClr>
+              </a:solidFill>
+              <a:cs typeface="Segoe UI" panose="020B0502040204020203" pitchFamily="34" charset="0"/>
+            </a:endParaRPr>
+          </a:p>
+        </p:txBody>
+      </p:sp>
     </p:spTree>
     <p:extLst>
       <p:ext uri="{BB962C8B-B14F-4D97-AF65-F5344CB8AC3E}">
@@ -20267,10 +20400,10 @@
                 <a:latin typeface="Segoe UI" panose="020B0502040204020203" pitchFamily="34" charset="0"/>
                 <a:cs typeface="Segoe UI" panose="020B0502040204020203" pitchFamily="34" charset="0"/>
               </a:rPr>
-              <a:t>Osnovna gradivna jedinica </a:t>
-            </a:r>
-            <a:r>
-              <a:rPr lang="sr-Latn-RS" i="1" dirty="0" smtClean="0">
+              <a:t>Osnovna gradivna </a:t>
+            </a:r>
+            <a:r>
+              <a:rPr lang="sr-Latn-RS" dirty="0" smtClean="0">
                 <a:solidFill>
                   <a:schemeClr val="tx1">
                     <a:lumMod val="75000"/>
@@ -20280,116 +20413,7 @@
                 <a:latin typeface="Segoe UI" panose="020B0502040204020203" pitchFamily="34" charset="0"/>
                 <a:cs typeface="Segoe UI" panose="020B0502040204020203" pitchFamily="34" charset="0"/>
               </a:rPr>
-              <a:t>Elasticsearch</a:t>
-            </a:r>
-            <a:r>
-              <a:rPr lang="sr-Latn-RS" dirty="0" smtClean="0">
-                <a:solidFill>
-                  <a:schemeClr val="tx1">
-                    <a:lumMod val="75000"/>
-                    <a:lumOff val="25000"/>
-                  </a:schemeClr>
-                </a:solidFill>
-                <a:latin typeface="Segoe UI" panose="020B0502040204020203" pitchFamily="34" charset="0"/>
-                <a:cs typeface="Segoe UI" panose="020B0502040204020203" pitchFamily="34" charset="0"/>
-              </a:rPr>
-              <a:t> distribuirane arhitekture.</a:t>
-            </a:r>
-          </a:p>
-          <a:p>
-            <a:pPr marL="285750" indent="-285750">
-              <a:lnSpc>
-                <a:spcPct val="150000"/>
-              </a:lnSpc>
-              <a:buFont typeface="Arial" panose="020B0604020202020204" pitchFamily="34" charset="0"/>
-              <a:buChar char="•"/>
-            </a:pPr>
-            <a:r>
-              <a:rPr lang="sr-Latn-RS" dirty="0" smtClean="0">
-                <a:solidFill>
-                  <a:schemeClr val="tx1">
-                    <a:lumMod val="75000"/>
-                    <a:lumOff val="25000"/>
-                  </a:schemeClr>
-                </a:solidFill>
-                <a:latin typeface="Segoe UI" panose="020B0502040204020203" pitchFamily="34" charset="0"/>
-                <a:cs typeface="Segoe UI" panose="020B0502040204020203" pitchFamily="34" charset="0"/>
-              </a:rPr>
-              <a:t>Tipovi </a:t>
-            </a:r>
-            <a:r>
-              <a:rPr lang="sr-Latn-RS" i="1" dirty="0" smtClean="0">
-                <a:solidFill>
-                  <a:schemeClr val="tx1">
-                    <a:lumMod val="75000"/>
-                    <a:lumOff val="25000"/>
-                  </a:schemeClr>
-                </a:solidFill>
-                <a:latin typeface="Segoe UI" panose="020B0502040204020203" pitchFamily="34" charset="0"/>
-                <a:cs typeface="Segoe UI" panose="020B0502040204020203" pitchFamily="34" charset="0"/>
-              </a:rPr>
-              <a:t>shard</a:t>
-            </a:r>
-            <a:r>
-              <a:rPr lang="sr-Latn-RS" dirty="0" smtClean="0">
-                <a:solidFill>
-                  <a:schemeClr val="tx1">
-                    <a:lumMod val="75000"/>
-                    <a:lumOff val="25000"/>
-                  </a:schemeClr>
-                </a:solidFill>
-                <a:latin typeface="Segoe UI" panose="020B0502040204020203" pitchFamily="34" charset="0"/>
-                <a:cs typeface="Segoe UI" panose="020B0502040204020203" pitchFamily="34" charset="0"/>
-              </a:rPr>
-              <a:t> komponenti:</a:t>
-            </a:r>
-          </a:p>
-          <a:p>
-            <a:pPr marL="800100" lvl="1" indent="-342900">
-              <a:lnSpc>
-                <a:spcPct val="150000"/>
-              </a:lnSpc>
-              <a:buFont typeface="+mj-lt"/>
-              <a:buAutoNum type="arabicPeriod"/>
-            </a:pPr>
-            <a:r>
-              <a:rPr lang="sr-Latn-RS" dirty="0" smtClean="0">
-                <a:solidFill>
-                  <a:schemeClr val="tx1">
-                    <a:lumMod val="75000"/>
-                    <a:lumOff val="25000"/>
-                  </a:schemeClr>
-                </a:solidFill>
-                <a:latin typeface="Segoe UI" panose="020B0502040204020203" pitchFamily="34" charset="0"/>
-                <a:cs typeface="Segoe UI" panose="020B0502040204020203" pitchFamily="34" charset="0"/>
-              </a:rPr>
-              <a:t>primarni (</a:t>
-            </a:r>
-            <a:r>
-              <a:rPr lang="sr-Latn-RS" i="1" dirty="0" smtClean="0">
-                <a:solidFill>
-                  <a:schemeClr val="tx1">
-                    <a:lumMod val="75000"/>
-                    <a:lumOff val="25000"/>
-                  </a:schemeClr>
-                </a:solidFill>
-                <a:latin typeface="Segoe UI" panose="020B0502040204020203" pitchFamily="34" charset="0"/>
-                <a:cs typeface="Segoe UI" panose="020B0502040204020203" pitchFamily="34" charset="0"/>
-              </a:rPr>
-              <a:t>eng. primary</a:t>
-            </a:r>
-            <a:r>
-              <a:rPr lang="sr-Latn-RS" dirty="0" smtClean="0">
-                <a:solidFill>
-                  <a:schemeClr val="tx1">
-                    <a:lumMod val="75000"/>
-                    <a:lumOff val="25000"/>
-                  </a:schemeClr>
-                </a:solidFill>
-                <a:latin typeface="Segoe UI" panose="020B0502040204020203" pitchFamily="34" charset="0"/>
-                <a:cs typeface="Segoe UI" panose="020B0502040204020203" pitchFamily="34" charset="0"/>
-              </a:rPr>
-              <a:t>)</a:t>
+              <a:t>jedinica</a:t>
             </a:r>
             <a:endParaRPr lang="sr-Latn-RS" dirty="0" smtClean="0">
               <a:solidFill>
@@ -20401,6 +20425,102 @@
               <a:latin typeface="Segoe UI" panose="020B0502040204020203" pitchFamily="34" charset="0"/>
               <a:cs typeface="Segoe UI" panose="020B0502040204020203" pitchFamily="34" charset="0"/>
             </a:endParaRPr>
+          </a:p>
+          <a:p>
+            <a:pPr marL="285750" indent="-285750">
+              <a:lnSpc>
+                <a:spcPct val="150000"/>
+              </a:lnSpc>
+              <a:buFont typeface="Arial" panose="020B0604020202020204" pitchFamily="34" charset="0"/>
+              <a:buChar char="•"/>
+            </a:pPr>
+            <a:r>
+              <a:rPr lang="sr-Latn-RS" dirty="0" smtClean="0">
+                <a:solidFill>
+                  <a:schemeClr val="tx1">
+                    <a:lumMod val="75000"/>
+                    <a:lumOff val="25000"/>
+                  </a:schemeClr>
+                </a:solidFill>
+                <a:latin typeface="Segoe UI" panose="020B0502040204020203" pitchFamily="34" charset="0"/>
+                <a:cs typeface="Segoe UI" panose="020B0502040204020203" pitchFamily="34" charset="0"/>
+              </a:rPr>
+              <a:t>Tipovi </a:t>
+            </a:r>
+            <a:r>
+              <a:rPr lang="sr-Latn-RS" i="1" dirty="0" smtClean="0">
+                <a:solidFill>
+                  <a:schemeClr val="tx1">
+                    <a:lumMod val="75000"/>
+                    <a:lumOff val="25000"/>
+                  </a:schemeClr>
+                </a:solidFill>
+                <a:latin typeface="Segoe UI" panose="020B0502040204020203" pitchFamily="34" charset="0"/>
+                <a:cs typeface="Segoe UI" panose="020B0502040204020203" pitchFamily="34" charset="0"/>
+              </a:rPr>
+              <a:t>shard</a:t>
+            </a:r>
+            <a:r>
+              <a:rPr lang="sr-Latn-RS" dirty="0" smtClean="0">
+                <a:solidFill>
+                  <a:schemeClr val="tx1">
+                    <a:lumMod val="75000"/>
+                    <a:lumOff val="25000"/>
+                  </a:schemeClr>
+                </a:solidFill>
+                <a:latin typeface="Segoe UI" panose="020B0502040204020203" pitchFamily="34" charset="0"/>
+                <a:cs typeface="Segoe UI" panose="020B0502040204020203" pitchFamily="34" charset="0"/>
+              </a:rPr>
+              <a:t> komponenti:</a:t>
+            </a:r>
+          </a:p>
+          <a:p>
+            <a:pPr marL="800100" lvl="1" indent="-342900">
+              <a:lnSpc>
+                <a:spcPct val="150000"/>
+              </a:lnSpc>
+              <a:buFont typeface="+mj-lt"/>
+              <a:buAutoNum type="arabicPeriod"/>
+            </a:pPr>
+            <a:r>
+              <a:rPr lang="sr-Latn-RS" dirty="0" smtClean="0">
+                <a:solidFill>
+                  <a:schemeClr val="tx1">
+                    <a:lumMod val="75000"/>
+                    <a:lumOff val="25000"/>
+                  </a:schemeClr>
+                </a:solidFill>
+                <a:latin typeface="Segoe UI" panose="020B0502040204020203" pitchFamily="34" charset="0"/>
+                <a:cs typeface="Segoe UI" panose="020B0502040204020203" pitchFamily="34" charset="0"/>
+              </a:rPr>
+              <a:t>primarni (</a:t>
+            </a:r>
+            <a:r>
+              <a:rPr lang="sr-Latn-RS" i="1" dirty="0" smtClean="0">
+                <a:solidFill>
+                  <a:schemeClr val="tx1">
+                    <a:lumMod val="75000"/>
+                    <a:lumOff val="25000"/>
+                  </a:schemeClr>
+                </a:solidFill>
+                <a:latin typeface="Segoe UI" panose="020B0502040204020203" pitchFamily="34" charset="0"/>
+                <a:cs typeface="Segoe UI" panose="020B0502040204020203" pitchFamily="34" charset="0"/>
+              </a:rPr>
+              <a:t>eng. primary</a:t>
+            </a:r>
+            <a:r>
+              <a:rPr lang="sr-Latn-RS" dirty="0" smtClean="0">
+                <a:solidFill>
+                  <a:schemeClr val="tx1">
+                    <a:lumMod val="75000"/>
+                    <a:lumOff val="25000"/>
+                  </a:schemeClr>
+                </a:solidFill>
+                <a:latin typeface="Segoe UI" panose="020B0502040204020203" pitchFamily="34" charset="0"/>
+                <a:cs typeface="Segoe UI" panose="020B0502040204020203" pitchFamily="34" charset="0"/>
+              </a:rPr>
+              <a:t>)</a:t>
+            </a:r>
           </a:p>
           <a:p>
             <a:pPr marL="800100" lvl="1" indent="-342900">
@@ -20564,7 +20684,7 @@
         </p:blipFill>
         <p:spPr>
           <a:xfrm>
-            <a:off x="690379" y="4372848"/>
+            <a:off x="1066800" y="4398974"/>
             <a:ext cx="10058400" cy="1488908"/>
           </a:xfrm>
           <a:prstGeom prst="rect">
@@ -20812,7 +20932,7 @@
               <a:buChar char="•"/>
             </a:pPr>
             <a:r>
-              <a:rPr lang="en-US" dirty="0" err="1" smtClean="0">
+              <a:rPr lang="en-US" i="1" dirty="0" smtClean="0">
                 <a:solidFill>
                   <a:schemeClr val="tx1">
                     <a:lumMod val="75000"/>
@@ -20822,7 +20942,20 @@
                 <a:latin typeface="Segoe UI" panose="020B0502040204020203" pitchFamily="34" charset="0"/>
                 <a:cs typeface="Segoe UI" panose="020B0502040204020203" pitchFamily="34" charset="0"/>
               </a:rPr>
-              <a:t>Jedan</a:t>
+              <a:t>Shard</a:t>
+            </a:r>
+            <a:r>
+              <a:rPr lang="sr-Latn-RS" dirty="0" smtClean="0">
+                <a:solidFill>
+                  <a:schemeClr val="tx1">
+                    <a:lumMod val="75000"/>
+                    <a:lumOff val="25000"/>
+                  </a:schemeClr>
+                </a:solidFill>
+                <a:latin typeface="Segoe UI" panose="020B0502040204020203" pitchFamily="34" charset="0"/>
+                <a:cs typeface="Segoe UI" panose="020B0502040204020203" pitchFamily="34" charset="0"/>
+              </a:rPr>
+              <a:t> se sastoji </a:t>
             </a:r>
             <a:r>
               <a:rPr lang="en-US" dirty="0" smtClean="0">
@@ -20835,10 +20968,23 @@
                 <a:latin typeface="Segoe UI" panose="020B0502040204020203" pitchFamily="34" charset="0"/>
                 <a:cs typeface="Segoe UI" panose="020B0502040204020203" pitchFamily="34" charset="0"/>
               </a:rPr>
+              <a:t>od</a:t>
+            </a:r>
+            <a:r>
+              <a:rPr lang="sr-Latn-RS" dirty="0" smtClean="0">
+                <a:solidFill>
+                  <a:schemeClr val="tx1">
+                    <a:lumMod val="75000"/>
+                    <a:lumOff val="25000"/>
+                  </a:schemeClr>
+                </a:solidFill>
+                <a:latin typeface="Segoe UI" panose="020B0502040204020203" pitchFamily="34" charset="0"/>
+                <a:cs typeface="Segoe UI" panose="020B0502040204020203" pitchFamily="34" charset="0"/>
+              </a:rPr>
               <a:t> </a:t>
             </a:r>
             <a:r>
-              <a:rPr lang="en-US" i="1" dirty="0" smtClean="0">
+              <a:rPr lang="sr-Latn-RS" dirty="0" smtClean="0">
                 <a:solidFill>
                   <a:schemeClr val="tx1">
                     <a:lumMod val="75000"/>
@@ -20848,20 +20994,7 @@
                 <a:latin typeface="Segoe UI" panose="020B0502040204020203" pitchFamily="34" charset="0"/>
                 <a:cs typeface="Segoe UI" panose="020B0502040204020203" pitchFamily="34" charset="0"/>
               </a:rPr>
-              <a:t>shard</a:t>
-            </a:r>
-            <a:r>
-              <a:rPr lang="sr-Latn-RS" dirty="0" smtClean="0">
-                <a:solidFill>
-                  <a:schemeClr val="tx1">
-                    <a:lumMod val="75000"/>
-                    <a:lumOff val="25000"/>
-                  </a:schemeClr>
-                </a:solidFill>
-                <a:latin typeface="Segoe UI" panose="020B0502040204020203" pitchFamily="34" charset="0"/>
-                <a:cs typeface="Segoe UI" panose="020B0502040204020203" pitchFamily="34" charset="0"/>
-              </a:rPr>
-              <a:t> se sastoji iz više </a:t>
+              <a:t>više </a:t>
             </a:r>
             <a:r>
               <a:rPr lang="sr-Latn-RS" i="1" dirty="0" smtClean="0">

</xml_diff>